<commit_message>
Fixes for string processing basics slides
</commit_message>
<xml_diff>
--- a/Courses/Software-Sciences/Module-2-DS-and-Algo/06.1-String-Processing-Basics/06.1-String-Processing-Basics.pptx
+++ b/Courses/Software-Sciences/Module-2-DS-and-Algo/06.1-String-Processing-Basics/06.1-String-Processing-Basics.pptx
@@ -145,13 +145,13 @@
   <p:extLst>
     <p:ext uri="{521415D9-36F7-43E2-AB2F-B90AF26B5E84}">
       <p14:sectionLst xmlns:p14="http://schemas.microsoft.com/office/powerpoint/2010/main">
-        <p14:section name="Intro" id="{75B910F1-82FA-4065-A8BF-8985173224E1}">
+        <p14:section name="Въведение" id="{75B910F1-82FA-4065-A8BF-8985173224E1}">
           <p14:sldIdLst>
             <p14:sldId id="494"/>
             <p14:sldId id="495"/>
           </p14:sldIdLst>
         </p14:section>
-        <p14:section name="Strings" id="{CCDC0104-1DDC-4FF9-8AC4-B5CDDDAC7D41}">
+        <p14:section name="Низове" id="{CCDC0104-1DDC-4FF9-8AC4-B5CDDDAC7D41}">
           <p14:sldIdLst>
             <p14:sldId id="641"/>
             <p14:sldId id="499"/>
@@ -159,7 +159,7 @@
             <p14:sldId id="501"/>
           </p14:sldIdLst>
         </p14:section>
-        <p14:section name="Manipulating Strings" id="{C9897B5E-0F9A-48AF-BB9C-C7F69D35E3D5}">
+        <p14:section name="Манипулиране на низ" id="{C9897B5E-0F9A-48AF-BB9C-C7F69D35E3D5}">
           <p14:sldIdLst>
             <p14:sldId id="642"/>
             <p14:sldId id="638"/>
@@ -179,7 +179,7 @@
             <p14:sldId id="624"/>
           </p14:sldIdLst>
         </p14:section>
-        <p14:section name="Building and Modifying Strings" id="{B75DB639-F27D-490A-8310-A0BF70CC032F}">
+        <p14:section name="Изграждане и модификация на низ" id="{B75DB639-F27D-490A-8310-A0BF70CC032F}">
           <p14:sldIdLst>
             <p14:sldId id="643"/>
             <p14:sldId id="516"/>
@@ -191,7 +191,7 @@
             <p14:sldId id="521"/>
           </p14:sldIdLst>
         </p14:section>
-        <p14:section name="Conclusion" id="{82734893-F642-403C-B68D-241CAD569015}">
+        <p14:section name="Обобщение" id="{82734893-F642-403C-B68D-241CAD569015}">
           <p14:sldIdLst>
             <p14:sldId id="349"/>
             <p14:sldId id="644"/>
@@ -324,7 +324,7 @@
           <a:p>
             <a:fld id="{4E087215-0C8F-4762-A664-737A353EC9A4}" type="datetimeFigureOut">
               <a:rPr lang="bg-BG" smtClean="0"/>
-              <a:t>6.7.2023 г.</a:t>
+              <a:t>19.08.23 г.</a:t>
             </a:fld>
             <a:endParaRPr lang="bg-BG" dirty="0"/>
           </a:p>
@@ -515,7 +515,7 @@
           <a:p>
             <a:fld id="{72D84649-876A-46C9-8472-14CB09C070D8}" type="datetimeFigureOut">
               <a:rPr lang="en-US" smtClean="0"/>
-              <a:t>7/6/2023</a:t>
+              <a:t>8/19/23</a:t>
             </a:fld>
             <a:endParaRPr lang="en-US" dirty="0"/>
           </a:p>
@@ -8042,22 +8042,33 @@
         </p:spPr>
         <p:txBody>
           <a:bodyPr>
-            <a:normAutofit lnSpcReduction="10000"/>
+            <a:normAutofit/>
           </a:bodyPr>
           <a:lstStyle/>
           <a:p>
             <a:r>
+              <a:rPr lang="bg-BG" sz="3550" dirty="0"/>
+              <a:t>Манипулиране </a:t>
+            </a:r>
+            <a:r>
               <a:rPr lang="en-US" sz="3550" dirty="0"/>
-              <a:t>Маниполиране на низ</a:t>
-            </a:r>
-            <a:endParaRPr lang="bg-BG" sz="3550" dirty="0">
-              <a:cs typeface="Calibri"/>
-            </a:endParaRPr>
-          </a:p>
-          <a:p>
+              <a:t>на низ</a:t>
+            </a:r>
+            <a:r>
+              <a:rPr lang="bg-BG" sz="3550" dirty="0"/>
+              <a:t> </a:t>
+            </a:r>
             <a:r>
               <a:rPr lang="en-US" sz="3550" dirty="0"/>
-              <a:t>чрез класа.NET String</a:t>
+              <a:t>чрез класа</a:t>
+            </a:r>
+            <a:r>
+              <a:rPr lang="bg-BG" sz="3550" dirty="0"/>
+              <a:t> </a:t>
+            </a:r>
+            <a:r>
+              <a:rPr lang="en-US" sz="3550" dirty="0"/>
+              <a:t>.NET String</a:t>
             </a:r>
             <a:endParaRPr lang="bg-BG" sz="3550" dirty="0">
               <a:cs typeface="Calibri"/>
@@ -8094,10 +8105,9 @@
           <a:lstStyle/>
           <a:p>
             <a:r>
-              <a:rPr lang="en-US" sz="5350" dirty="0"/>
-              <a:t>Низ и текстови операции</a:t>
-            </a:r>
-            <a:endParaRPr lang="bg-BG" sz="5350" dirty="0"/>
+              <a:rPr lang="bg-BG" sz="5350" dirty="0"/>
+              <a:t>Стрингообработка</a:t>
+            </a:r>
           </a:p>
         </p:txBody>
       </p:sp>
@@ -9033,11 +9043,18 @@
               <a:t>Решение: </a:t>
             </a:r>
             <a:r>
+              <a:rPr lang="bg-BG" sz="3950" dirty="0">
+                <a:ea typeface="+mj-lt"/>
+                <a:cs typeface="+mj-lt"/>
+              </a:rPr>
+              <a:t>Повторение</a:t>
+            </a:r>
+            <a:r>
               <a:rPr lang="en-US" sz="3950" dirty="0">
                 <a:ea typeface="+mj-lt"/>
                 <a:cs typeface="+mj-lt"/>
               </a:rPr>
-              <a:t>Повтаряне на низове</a:t>
+              <a:t> на низове</a:t>
             </a:r>
             <a:endParaRPr lang="en-US" sz="3950" dirty="0"/>
           </a:p>
@@ -9305,7 +9322,7 @@
             <a:pPr algn="ctr"/>
             <a:r>
               <a:rPr lang="bg-BG" sz="1999" dirty="0"/>
-              <a:t>Проверете решението тук</a:t>
+              <a:t>Проверете решението си тук</a:t>
             </a:r>
             <a:r>
               <a:rPr lang="en-US" sz="1999" dirty="0"/>
@@ -9821,20 +9838,32 @@
               <a:t>()</a:t>
             </a:r>
             <a:r>
+              <a:rPr lang="en-US" sz="3600" dirty="0">
+                <a:solidFill>
+                  <a:schemeClr val="bg1"/>
+                </a:solidFill>
+              </a:rPr>
+              <a:t> </a:t>
+            </a:r>
+            <a:r>
               <a:rPr lang="en-US" sz="3600" dirty="0"/>
-              <a:t> – </a:t>
-            </a:r>
-            <a:r>
-              <a:rPr lang="en-US" sz="3600" noProof="1"/>
-              <a:t>връща </a:t>
-            </a:r>
-            <a:r>
-              <a:rPr lang="en-US" sz="3600" b="1" noProof="1">
-                <a:solidFill>
-                  <a:schemeClr val="accent1"/>
-                </a:solidFill>
-              </a:rPr>
-              <a:t>първия индекс </a:t>
+              <a:t>–</a:t>
+            </a:r>
+            <a:r>
+              <a:rPr lang="bg-BG" sz="3600" dirty="0"/>
+              <a:t> връща </a:t>
+            </a:r>
+            <a:r>
+              <a:rPr lang="bg-BG" sz="3600" b="1" dirty="0">
+                <a:solidFill>
+                  <a:schemeClr val="bg1"/>
+                </a:solidFill>
+              </a:rPr>
+              <a:t>индекса</a:t>
+            </a:r>
+            <a:r>
+              <a:rPr lang="bg-BG" sz="3600" dirty="0"/>
+              <a:t>, на който се намира елементът, </a:t>
             </a:r>
             <a:r>
               <a:rPr lang="en-US" sz="3600" noProof="1"/>
@@ -9850,21 +9879,9 @@
             </a:r>
             <a:r>
               <a:rPr lang="bg-BG" sz="3600" noProof="1"/>
-              <a:t>, ако елементът не е намерен</a:t>
-            </a:r>
-            <a:r>
-              <a:rPr lang="bg-BG" sz="3600" noProof="1">
-                <a:solidFill>
-                  <a:schemeClr val="bg1"/>
-                </a:solidFill>
-              </a:rPr>
-              <a:t> </a:t>
-            </a:r>
-            <a:endParaRPr lang="bg-BG" sz="3600" dirty="0">
-              <a:solidFill>
-                <a:schemeClr val="bg1"/>
-              </a:solidFill>
-            </a:endParaRPr>
+              <a:t>, ако елементът не е намерен:</a:t>
+            </a:r>
+            <a:endParaRPr lang="bg-BG" sz="3600" dirty="0"/>
           </a:p>
           <a:p>
             <a:pPr marL="0" indent="0">
@@ -10281,9 +10298,7 @@
             <a:r>
               <a:rPr lang="en-US" sz="2800" b="1" noProof="1">
                 <a:solidFill>
-                  <a:schemeClr val="accent2">
-                    <a:lumMod val="75000"/>
-                  </a:schemeClr>
+                  <a:schemeClr val="accent2"/>
                 </a:solidFill>
                 <a:latin typeface="Consolas" panose="020B0609020204030204" pitchFamily="49" charset="0"/>
                 <a:cs typeface="Consolas" panose="020B0609020204030204" pitchFamily="49" charset="0"/>
@@ -10291,6 +10306,9 @@
               <a:t>// 0</a:t>
             </a:r>
             <a:endParaRPr lang="en-BG" sz="2800" b="1" dirty="0">
+              <a:solidFill>
+                <a:schemeClr val="accent2"/>
+              </a:solidFill>
               <a:latin typeface="Consolas" panose="020B0609020204030204" pitchFamily="49" charset="0"/>
               <a:cs typeface="Consolas" panose="020B0609020204030204" pitchFamily="49" charset="0"/>
             </a:endParaRPr>
@@ -10343,9 +10361,7 @@
             <a:r>
               <a:rPr lang="en-US" sz="2800" b="1" noProof="1">
                 <a:solidFill>
-                  <a:schemeClr val="accent2">
-                    <a:lumMod val="75000"/>
-                  </a:schemeClr>
+                  <a:schemeClr val="accent2"/>
                 </a:solidFill>
                 <a:latin typeface="Consolas" panose="020B0609020204030204" pitchFamily="49" charset="0"/>
                 <a:cs typeface="Consolas" panose="020B0609020204030204" pitchFamily="49" charset="0"/>
@@ -10355,9 +10371,7 @@
             <a:r>
               <a:rPr lang="bg-BG" sz="2800" b="1" noProof="1">
                 <a:solidFill>
-                  <a:schemeClr val="accent2">
-                    <a:lumMod val="75000"/>
-                  </a:schemeClr>
+                  <a:schemeClr val="accent2"/>
                 </a:solidFill>
                 <a:latin typeface="Consolas" panose="020B0609020204030204" pitchFamily="49" charset="0"/>
                 <a:cs typeface="Consolas" panose="020B0609020204030204" pitchFamily="49" charset="0"/>
@@ -10365,6 +10379,9 @@
               <a:t>1</a:t>
             </a:r>
             <a:endParaRPr lang="en-BG" sz="2800" b="1" dirty="0">
+              <a:solidFill>
+                <a:schemeClr val="accent2"/>
+              </a:solidFill>
               <a:latin typeface="Consolas" panose="020B0609020204030204" pitchFamily="49" charset="0"/>
               <a:cs typeface="Consolas" panose="020B0609020204030204" pitchFamily="49" charset="0"/>
             </a:endParaRPr>
@@ -10417,9 +10434,7 @@
             <a:r>
               <a:rPr lang="en-US" sz="2800" b="1" noProof="1">
                 <a:solidFill>
-                  <a:schemeClr val="accent2">
-                    <a:lumMod val="75000"/>
-                  </a:schemeClr>
+                  <a:schemeClr val="accent2"/>
                 </a:solidFill>
                 <a:latin typeface="Consolas" panose="020B0609020204030204" pitchFamily="49" charset="0"/>
                 <a:cs typeface="Consolas" panose="020B0609020204030204" pitchFamily="49" charset="0"/>
@@ -10429,9 +10444,7 @@
             <a:r>
               <a:rPr lang="bg-BG" sz="2800" b="1" noProof="1">
                 <a:solidFill>
-                  <a:schemeClr val="accent2">
-                    <a:lumMod val="75000"/>
-                  </a:schemeClr>
+                  <a:schemeClr val="accent2"/>
                 </a:solidFill>
                 <a:latin typeface="Consolas" panose="020B0609020204030204" pitchFamily="49" charset="0"/>
                 <a:cs typeface="Consolas" panose="020B0609020204030204" pitchFamily="49" charset="0"/>
@@ -10439,6 +10452,9 @@
               <a:t>-1</a:t>
             </a:r>
             <a:endParaRPr lang="en-BG" sz="2800" b="1" dirty="0">
+              <a:solidFill>
+                <a:schemeClr val="accent2"/>
+              </a:solidFill>
               <a:latin typeface="Consolas" panose="020B0609020204030204" pitchFamily="49" charset="0"/>
               <a:cs typeface="Consolas" panose="020B0609020204030204" pitchFamily="49" charset="0"/>
             </a:endParaRPr>
@@ -10888,8 +10904,16 @@
               <a:t>()</a:t>
             </a:r>
             <a:r>
+              <a:rPr lang="en-US" sz="3600" dirty="0">
+                <a:solidFill>
+                  <a:schemeClr val="bg1"/>
+                </a:solidFill>
+              </a:rPr>
+              <a:t> </a:t>
+            </a:r>
+            <a:r>
               <a:rPr lang="en-US" sz="3600" dirty="0"/>
-              <a:t> – </a:t>
+              <a:t>– </a:t>
             </a:r>
             <a:r>
               <a:rPr lang="en-US" sz="3600" dirty="0">
@@ -10901,34 +10925,26 @@
             <a:r>
               <a:rPr lang="en-US" sz="3600" b="1" dirty="0">
                 <a:solidFill>
-                  <a:schemeClr val="accent1"/>
+                  <a:schemeClr val="bg1"/>
                 </a:solidFill>
               </a:rPr>
               <a:t>последния индекс</a:t>
             </a:r>
             <a:r>
+              <a:rPr lang="bg-BG" sz="3600" dirty="0"/>
+              <a:t>, на който се намира дадения елемент, или </a:t>
+            </a:r>
+            <a:r>
               <a:rPr lang="bg-BG" sz="3600" b="1" dirty="0">
                 <a:solidFill>
-                  <a:schemeClr val="accent1"/>
-                </a:solidFill>
-              </a:rPr>
-              <a:t> </a:t>
+                  <a:schemeClr val="bg1"/>
+                </a:solidFill>
+              </a:rPr>
+              <a:t>-1</a:t>
             </a:r>
             <a:r>
               <a:rPr lang="bg-BG" sz="3600" dirty="0"/>
-              <a:t>или </a:t>
-            </a:r>
-            <a:r>
-              <a:rPr lang="bg-BG" sz="3600" b="1" dirty="0">
-                <a:solidFill>
-                  <a:schemeClr val="accent1"/>
-                </a:solidFill>
-              </a:rPr>
-              <a:t>-1</a:t>
-            </a:r>
-            <a:r>
-              <a:rPr lang="bg-BG" sz="3600" dirty="0"/>
-              <a:t>, ако елементът не е намерен</a:t>
+              <a:t>, ако не е намерен</a:t>
             </a:r>
             <a:endParaRPr lang="en-US" sz="3600" dirty="0">
               <a:cs typeface="Calibri"/>
@@ -11258,9 +11274,7 @@
             <a:r>
               <a:rPr lang="en-US" sz="2800" b="1" noProof="1">
                 <a:solidFill>
-                  <a:schemeClr val="accent2">
-                    <a:lumMod val="75000"/>
-                  </a:schemeClr>
+                  <a:schemeClr val="accent2"/>
                 </a:solidFill>
                 <a:latin typeface="Consolas" panose="020B0609020204030204" pitchFamily="49" charset="0"/>
                 <a:cs typeface="Consolas" panose="020B0609020204030204" pitchFamily="49" charset="0"/>
@@ -11268,6 +11282,9 @@
               <a:t>// 21</a:t>
             </a:r>
             <a:endParaRPr lang="en-BG" sz="2800" b="1" dirty="0">
+              <a:solidFill>
+                <a:schemeClr val="accent2"/>
+              </a:solidFill>
               <a:latin typeface="Consolas" panose="020B0609020204030204" pitchFamily="49" charset="0"/>
               <a:cs typeface="Consolas" panose="020B0609020204030204" pitchFamily="49" charset="0"/>
             </a:endParaRPr>
@@ -11320,9 +11337,7 @@
             <a:r>
               <a:rPr lang="en-US" sz="2800" b="1" noProof="1">
                 <a:solidFill>
-                  <a:schemeClr val="accent2">
-                    <a:lumMod val="75000"/>
-                  </a:schemeClr>
+                  <a:schemeClr val="accent2"/>
                 </a:solidFill>
                 <a:latin typeface="Consolas" panose="020B0609020204030204" pitchFamily="49" charset="0"/>
                 <a:cs typeface="Consolas" panose="020B0609020204030204" pitchFamily="49" charset="0"/>
@@ -11330,6 +11345,9 @@
               <a:t>// 29</a:t>
             </a:r>
             <a:endParaRPr lang="en-BG" sz="2800" b="1" dirty="0">
+              <a:solidFill>
+                <a:schemeClr val="accent2"/>
+              </a:solidFill>
               <a:latin typeface="Consolas" panose="020B0609020204030204" pitchFamily="49" charset="0"/>
               <a:cs typeface="Consolas" panose="020B0609020204030204" pitchFamily="49" charset="0"/>
             </a:endParaRPr>
@@ -11382,9 +11400,7 @@
             <a:r>
               <a:rPr lang="en-US" sz="2800" b="1" noProof="1">
                 <a:solidFill>
-                  <a:schemeClr val="accent2">
-                    <a:lumMod val="75000"/>
-                  </a:schemeClr>
+                  <a:schemeClr val="accent2"/>
                 </a:solidFill>
                 <a:latin typeface="Consolas" panose="020B0609020204030204" pitchFamily="49" charset="0"/>
                 <a:cs typeface="Consolas" panose="020B0609020204030204" pitchFamily="49" charset="0"/>
@@ -11394,9 +11410,7 @@
             <a:r>
               <a:rPr lang="bg-BG" sz="2800" b="1" noProof="1">
                 <a:solidFill>
-                  <a:schemeClr val="accent2">
-                    <a:lumMod val="75000"/>
-                  </a:schemeClr>
+                  <a:schemeClr val="accent2"/>
                 </a:solidFill>
                 <a:latin typeface="Consolas" panose="020B0609020204030204" pitchFamily="49" charset="0"/>
                 <a:cs typeface="Consolas" panose="020B0609020204030204" pitchFamily="49" charset="0"/>
@@ -11404,6 +11418,9 @@
               <a:t>-1</a:t>
             </a:r>
             <a:endParaRPr lang="en-BG" sz="2800" b="1" dirty="0">
+              <a:solidFill>
+                <a:schemeClr val="accent2"/>
+              </a:solidFill>
               <a:latin typeface="Consolas" panose="020B0609020204030204" pitchFamily="49" charset="0"/>
               <a:cs typeface="Consolas" panose="020B0609020204030204" pitchFamily="49" charset="0"/>
             </a:endParaRPr>
@@ -11809,13 +11826,32 @@
             </a:r>
             <a:r>
               <a:rPr lang="en-US" sz="3600" dirty="0"/>
-              <a:t> – проверява дали</a:t>
+              <a:t> – </a:t>
             </a:r>
             <a:r>
               <a:rPr lang="bg-BG" sz="3600" dirty="0"/>
-              <a:t> низа съдържа даден подниз</a:t>
-            </a:r>
-            <a:endParaRPr lang="en-US" sz="3600" dirty="0">
+              <a:t>проверява</a:t>
+            </a:r>
+            <a:r>
+              <a:rPr lang="en-US" sz="3600" dirty="0"/>
+              <a:t> </a:t>
+            </a:r>
+            <a:r>
+              <a:rPr lang="bg-BG" sz="3600" dirty="0"/>
+              <a:t>дали низът съдържа даден </a:t>
+            </a:r>
+            <a:r>
+              <a:rPr lang="bg-BG" sz="3600" b="1" dirty="0">
+                <a:solidFill>
+                  <a:schemeClr val="bg1"/>
+                </a:solidFill>
+              </a:rPr>
+              <a:t>подниз</a:t>
+            </a:r>
+            <a:endParaRPr lang="en-US" sz="3600" b="1" dirty="0">
+              <a:solidFill>
+                <a:schemeClr val="bg1"/>
+              </a:solidFill>
               <a:cs typeface="Calibri"/>
             </a:endParaRPr>
           </a:p>
@@ -12278,9 +12314,7 @@
             <a:r>
               <a:rPr lang="en-US" sz="2800" b="1" noProof="1">
                 <a:solidFill>
-                  <a:schemeClr val="accent2">
-                    <a:lumMod val="75000"/>
-                  </a:schemeClr>
+                  <a:schemeClr val="accent2"/>
                 </a:solidFill>
                 <a:latin typeface="Consolas" panose="020B0609020204030204" pitchFamily="49" charset="0"/>
                 <a:cs typeface="Consolas" panose="020B0609020204030204" pitchFamily="49" charset="0"/>
@@ -12288,6 +12322,9 @@
               <a:t>// True</a:t>
             </a:r>
             <a:endParaRPr lang="en-BG" sz="2800" b="1" dirty="0">
+              <a:solidFill>
+                <a:schemeClr val="accent2"/>
+              </a:solidFill>
               <a:latin typeface="Consolas" panose="020B0609020204030204" pitchFamily="49" charset="0"/>
               <a:cs typeface="Consolas" panose="020B0609020204030204" pitchFamily="49" charset="0"/>
             </a:endParaRPr>
@@ -12340,9 +12377,7 @@
             <a:r>
               <a:rPr lang="en-US" sz="2800" b="1" noProof="1">
                 <a:solidFill>
-                  <a:schemeClr val="accent2">
-                    <a:lumMod val="75000"/>
-                  </a:schemeClr>
+                  <a:schemeClr val="accent2"/>
                 </a:solidFill>
                 <a:latin typeface="Consolas" panose="020B0609020204030204" pitchFamily="49" charset="0"/>
                 <a:cs typeface="Consolas" panose="020B0609020204030204" pitchFamily="49" charset="0"/>
@@ -12350,6 +12385,9 @@
               <a:t>// False</a:t>
             </a:r>
             <a:endParaRPr lang="en-BG" sz="2800" b="1" dirty="0">
+              <a:solidFill>
+                <a:schemeClr val="accent2"/>
+              </a:solidFill>
               <a:latin typeface="Consolas" panose="020B0609020204030204" pitchFamily="49" charset="0"/>
               <a:cs typeface="Consolas" panose="020B0609020204030204" pitchFamily="49" charset="0"/>
             </a:endParaRPr>
@@ -12402,9 +12440,7 @@
             <a:r>
               <a:rPr lang="en-US" sz="2800" b="1" noProof="1">
                 <a:solidFill>
-                  <a:schemeClr val="accent2">
-                    <a:lumMod val="75000"/>
-                  </a:schemeClr>
+                  <a:schemeClr val="accent2"/>
                 </a:solidFill>
                 <a:latin typeface="Consolas" panose="020B0609020204030204" pitchFamily="49" charset="0"/>
                 <a:cs typeface="Consolas" panose="020B0609020204030204" pitchFamily="49" charset="0"/>
@@ -12412,6 +12448,9 @@
               <a:t>// False</a:t>
             </a:r>
             <a:endParaRPr lang="en-BG" sz="2800" b="1" dirty="0">
+              <a:solidFill>
+                <a:schemeClr val="accent2"/>
+              </a:solidFill>
               <a:latin typeface="Consolas" panose="020B0609020204030204" pitchFamily="49" charset="0"/>
               <a:cs typeface="Consolas" panose="020B0609020204030204" pitchFamily="49" charset="0"/>
             </a:endParaRPr>
@@ -13622,7 +13661,7 @@
         </p:nvSpPr>
         <p:spPr>
           <a:xfrm>
-            <a:off x="6096000" y="3055534"/>
+            <a:off x="5961000" y="3055534"/>
             <a:ext cx="1335000" cy="665924"/>
           </a:xfrm>
           <a:prstGeom prst="rect">
@@ -13654,9 +13693,7 @@
             <a:r>
               <a:rPr lang="en-US" sz="2800" b="1" noProof="1">
                 <a:solidFill>
-                  <a:schemeClr val="accent2">
-                    <a:lumMod val="75000"/>
-                  </a:schemeClr>
+                  <a:schemeClr val="accent2"/>
                 </a:solidFill>
                 <a:latin typeface="Consolas" panose="020B0609020204030204" pitchFamily="49" charset="0"/>
                 <a:cs typeface="Consolas" panose="020B0609020204030204" pitchFamily="49" charset="0"/>
@@ -13664,6 +13701,9 @@
               <a:t>// 10</a:t>
             </a:r>
             <a:endParaRPr lang="en-BG" sz="2800" b="1" dirty="0">
+              <a:solidFill>
+                <a:schemeClr val="accent2"/>
+              </a:solidFill>
               <a:latin typeface="Consolas" panose="020B0609020204030204" pitchFamily="49" charset="0"/>
               <a:cs typeface="Consolas" panose="020B0609020204030204" pitchFamily="49" charset="0"/>
             </a:endParaRPr>
@@ -13684,8 +13724,8 @@
         </p:nvSpPr>
         <p:spPr>
           <a:xfrm>
-            <a:off x="6951000" y="5715404"/>
-            <a:ext cx="2340000" cy="665924"/>
+            <a:off x="7086000" y="5715404"/>
+            <a:ext cx="1710000" cy="665924"/>
           </a:xfrm>
           <a:prstGeom prst="rect">
             <a:avLst/>
@@ -13716,9 +13756,7 @@
             <a:r>
               <a:rPr lang="en-US" sz="2800" b="1" noProof="1">
                 <a:solidFill>
-                  <a:schemeClr val="accent2">
-                    <a:lumMod val="75000"/>
-                  </a:schemeClr>
+                  <a:schemeClr val="accent2"/>
                 </a:solidFill>
                 <a:latin typeface="Consolas" panose="020B0609020204030204" pitchFamily="49" charset="0"/>
                 <a:cs typeface="Consolas" panose="020B0609020204030204" pitchFamily="49" charset="0"/>
@@ -13726,6 +13764,9 @@
               <a:t>// John</a:t>
             </a:r>
             <a:endParaRPr lang="en-BG" sz="2800" b="1" dirty="0">
+              <a:solidFill>
+                <a:schemeClr val="accent2"/>
+              </a:solidFill>
               <a:latin typeface="Consolas" panose="020B0609020204030204" pitchFamily="49" charset="0"/>
               <a:cs typeface="Consolas" panose="020B0609020204030204" pitchFamily="49" charset="0"/>
             </a:endParaRPr>
@@ -13785,84 +13826,6 @@
                                         </p:cTn>
                                         <p:tgtEl>
                                           <p:spTgt spid="7">
-                                            <p:bg/>
-                                          </p:spTgt>
-                                        </p:tgtEl>
-                                        <p:attrNameLst>
-                                          <p:attrName>style.visibility</p:attrName>
-                                        </p:attrNameLst>
-                                      </p:cBhvr>
-                                      <p:to>
-                                        <p:strVal val="visible"/>
-                                      </p:to>
-                                    </p:set>
-                                  </p:childTnLst>
-                                </p:cTn>
-                              </p:par>
-                              <p:par>
-                                <p:cTn id="7" presetID="1" presetClass="entr" presetSubtype="0" fill="hold" nodeType="withEffect">
-                                  <p:stCondLst>
-                                    <p:cond delay="0"/>
-                                  </p:stCondLst>
-                                  <p:childTnLst>
-                                    <p:set>
-                                      <p:cBhvr>
-                                        <p:cTn id="8" dur="1" fill="hold">
-                                          <p:stCondLst>
-                                            <p:cond delay="0"/>
-                                          </p:stCondLst>
-                                        </p:cTn>
-                                        <p:tgtEl>
-                                          <p:spTgt spid="7">
-                                            <p:txEl>
-                                              <p:pRg st="0" end="0"/>
-                                            </p:txEl>
-                                          </p:spTgt>
-                                        </p:tgtEl>
-                                        <p:attrNameLst>
-                                          <p:attrName>style.visibility</p:attrName>
-                                        </p:attrNameLst>
-                                      </p:cBhvr>
-                                      <p:to>
-                                        <p:strVal val="visible"/>
-                                      </p:to>
-                                    </p:set>
-                                  </p:childTnLst>
-                                </p:cTn>
-                              </p:par>
-                            </p:childTnLst>
-                          </p:cTn>
-                        </p:par>
-                      </p:childTnLst>
-                    </p:cTn>
-                  </p:par>
-                  <p:par>
-                    <p:cTn id="9" fill="hold">
-                      <p:stCondLst>
-                        <p:cond delay="indefinite"/>
-                      </p:stCondLst>
-                      <p:childTnLst>
-                        <p:par>
-                          <p:cTn id="10" fill="hold">
-                            <p:stCondLst>
-                              <p:cond delay="0"/>
-                            </p:stCondLst>
-                            <p:childTnLst>
-                              <p:par>
-                                <p:cTn id="11" presetID="1" presetClass="entr" presetSubtype="0" fill="hold" grpId="0" nodeType="clickEffect">
-                                  <p:stCondLst>
-                                    <p:cond delay="0"/>
-                                  </p:stCondLst>
-                                  <p:childTnLst>
-                                    <p:set>
-                                      <p:cBhvr>
-                                        <p:cTn id="12" dur="1" fill="hold">
-                                          <p:stCondLst>
-                                            <p:cond delay="0"/>
-                                          </p:stCondLst>
-                                        </p:cTn>
-                                        <p:tgtEl>
-                                          <p:spTgt spid="7">
                                             <p:txEl>
                                               <p:pRg st="1" end="1"/>
                                             </p:txEl>
@@ -13886,26 +13849,26 @@
                     </p:cTn>
                   </p:par>
                   <p:par>
-                    <p:cTn id="13" fill="hold">
+                    <p:cTn id="7" fill="hold">
                       <p:stCondLst>
                         <p:cond delay="indefinite"/>
                       </p:stCondLst>
                       <p:childTnLst>
                         <p:par>
-                          <p:cTn id="14" fill="hold">
+                          <p:cTn id="8" fill="hold">
                             <p:stCondLst>
                               <p:cond delay="0"/>
                             </p:stCondLst>
                             <p:childTnLst>
                               <p:par>
-                                <p:cTn id="15" presetID="1" presetClass="entr" presetSubtype="0" fill="hold" grpId="0" nodeType="clickEffect">
+                                <p:cTn id="9" presetID="1" presetClass="entr" presetSubtype="0" fill="hold" grpId="0" nodeType="clickEffect">
                                   <p:stCondLst>
                                     <p:cond delay="0"/>
                                   </p:stCondLst>
                                   <p:childTnLst>
                                     <p:set>
                                       <p:cBhvr>
-                                        <p:cTn id="16" dur="1" fill="hold">
+                                        <p:cTn id="10" dur="1" fill="hold">
                                           <p:stCondLst>
                                             <p:cond delay="0"/>
                                           </p:stCondLst>
@@ -13935,26 +13898,26 @@
                     </p:cTn>
                   </p:par>
                   <p:par>
-                    <p:cTn id="17" fill="hold">
+                    <p:cTn id="11" fill="hold">
                       <p:stCondLst>
                         <p:cond delay="indefinite"/>
                       </p:stCondLst>
                       <p:childTnLst>
                         <p:par>
-                          <p:cTn id="18" fill="hold">
+                          <p:cTn id="12" fill="hold">
                             <p:stCondLst>
                               <p:cond delay="0"/>
                             </p:stCondLst>
                             <p:childTnLst>
                               <p:par>
-                                <p:cTn id="19" presetID="1" presetClass="entr" presetSubtype="0" fill="hold" grpId="1" nodeType="clickEffect">
+                                <p:cTn id="13" presetID="1" presetClass="entr" presetSubtype="0" fill="hold" grpId="1" nodeType="clickEffect">
                                   <p:stCondLst>
                                     <p:cond delay="0"/>
                                   </p:stCondLst>
                                   <p:childTnLst>
                                     <p:set>
                                       <p:cBhvr>
-                                        <p:cTn id="20" dur="1" fill="hold">
+                                        <p:cTn id="14" dur="1" fill="hold">
                                           <p:stCondLst>
                                             <p:cond delay="0"/>
                                           </p:stCondLst>
@@ -13980,26 +13943,26 @@
                     </p:cTn>
                   </p:par>
                   <p:par>
-                    <p:cTn id="21" fill="hold">
+                    <p:cTn id="15" fill="hold">
                       <p:stCondLst>
                         <p:cond delay="indefinite"/>
                       </p:stCondLst>
                       <p:childTnLst>
                         <p:par>
-                          <p:cTn id="22" fill="hold">
+                          <p:cTn id="16" fill="hold">
                             <p:stCondLst>
                               <p:cond delay="0"/>
                             </p:stCondLst>
                             <p:childTnLst>
                               <p:par>
-                                <p:cTn id="23" presetID="1" presetClass="entr" presetSubtype="0" fill="hold" nodeType="clickEffect">
+                                <p:cTn id="17" presetID="1" presetClass="entr" presetSubtype="0" fill="hold" nodeType="clickEffect">
                                   <p:stCondLst>
                                     <p:cond delay="0"/>
                                   </p:stCondLst>
                                   <p:childTnLst>
                                     <p:set>
                                       <p:cBhvr>
-                                        <p:cTn id="24" dur="1" fill="hold">
+                                        <p:cTn id="18" dur="1" fill="hold">
                                           <p:stCondLst>
                                             <p:cond delay="0"/>
                                           </p:stCondLst>
@@ -14022,33 +13985,15 @@
                                   </p:childTnLst>
                                 </p:cTn>
                               </p:par>
-                            </p:childTnLst>
-                          </p:cTn>
-                        </p:par>
-                      </p:childTnLst>
-                    </p:cTn>
-                  </p:par>
-                  <p:par>
-                    <p:cTn id="25" fill="hold">
-                      <p:stCondLst>
-                        <p:cond delay="indefinite"/>
-                      </p:stCondLst>
-                      <p:childTnLst>
-                        <p:par>
-                          <p:cTn id="26" fill="hold">
-                            <p:stCondLst>
-                              <p:cond delay="0"/>
-                            </p:stCondLst>
-                            <p:childTnLst>
                               <p:par>
-                                <p:cTn id="27" presetID="1" presetClass="entr" presetSubtype="0" fill="hold" grpId="0" nodeType="clickEffect">
+                                <p:cTn id="19" presetID="1" presetClass="entr" presetSubtype="0" fill="hold" grpId="0" nodeType="withEffect">
                                   <p:stCondLst>
                                     <p:cond delay="0"/>
                                   </p:stCondLst>
                                   <p:childTnLst>
                                     <p:set>
                                       <p:cBhvr>
-                                        <p:cTn id="28" dur="1" fill="hold">
+                                        <p:cTn id="20" dur="1" fill="hold">
                                           <p:stCondLst>
                                             <p:cond delay="0"/>
                                           </p:stCondLst>
@@ -14068,7 +14013,105 @@
                                 </p:cTn>
                               </p:par>
                               <p:par>
-                                <p:cTn id="29" presetID="1" presetClass="entr" presetSubtype="0" fill="hold" nodeType="withEffect">
+                                <p:cTn id="21" presetID="1" presetClass="entr" presetSubtype="0" fill="hold" nodeType="withEffect">
+                                  <p:stCondLst>
+                                    <p:cond delay="0"/>
+                                  </p:stCondLst>
+                                  <p:childTnLst>
+                                    <p:set>
+                                      <p:cBhvr>
+                                        <p:cTn id="22" dur="1" fill="hold">
+                                          <p:stCondLst>
+                                            <p:cond delay="0"/>
+                                          </p:stCondLst>
+                                        </p:cTn>
+                                        <p:tgtEl>
+                                          <p:spTgt spid="8">
+                                            <p:txEl>
+                                              <p:pRg st="0" end="0"/>
+                                            </p:txEl>
+                                          </p:spTgt>
+                                        </p:tgtEl>
+                                        <p:attrNameLst>
+                                          <p:attrName>style.visibility</p:attrName>
+                                        </p:attrNameLst>
+                                      </p:cBhvr>
+                                      <p:to>
+                                        <p:strVal val="visible"/>
+                                      </p:to>
+                                    </p:set>
+                                  </p:childTnLst>
+                                </p:cTn>
+                              </p:par>
+                            </p:childTnLst>
+                          </p:cTn>
+                        </p:par>
+                      </p:childTnLst>
+                    </p:cTn>
+                  </p:par>
+                  <p:par>
+                    <p:cTn id="23" fill="hold">
+                      <p:stCondLst>
+                        <p:cond delay="indefinite"/>
+                      </p:stCondLst>
+                      <p:childTnLst>
+                        <p:par>
+                          <p:cTn id="24" fill="hold">
+                            <p:stCondLst>
+                              <p:cond delay="0"/>
+                            </p:stCondLst>
+                            <p:childTnLst>
+                              <p:par>
+                                <p:cTn id="25" presetID="1" presetClass="entr" presetSubtype="0" fill="hold" nodeType="clickEffect">
+                                  <p:stCondLst>
+                                    <p:cond delay="0"/>
+                                  </p:stCondLst>
+                                  <p:childTnLst>
+                                    <p:set>
+                                      <p:cBhvr>
+                                        <p:cTn id="26" dur="1" fill="hold">
+                                          <p:stCondLst>
+                                            <p:cond delay="0"/>
+                                          </p:stCondLst>
+                                        </p:cTn>
+                                        <p:tgtEl>
+                                          <p:spTgt spid="8">
+                                            <p:txEl>
+                                              <p:pRg st="1" end="1"/>
+                                            </p:txEl>
+                                          </p:spTgt>
+                                        </p:tgtEl>
+                                        <p:attrNameLst>
+                                          <p:attrName>style.visibility</p:attrName>
+                                        </p:attrNameLst>
+                                      </p:cBhvr>
+                                      <p:to>
+                                        <p:strVal val="visible"/>
+                                      </p:to>
+                                    </p:set>
+                                  </p:childTnLst>
+                                </p:cTn>
+                              </p:par>
+                            </p:childTnLst>
+                          </p:cTn>
+                        </p:par>
+                      </p:childTnLst>
+                    </p:cTn>
+                  </p:par>
+                  <p:par>
+                    <p:cTn id="27" fill="hold">
+                      <p:stCondLst>
+                        <p:cond delay="indefinite"/>
+                      </p:stCondLst>
+                      <p:childTnLst>
+                        <p:par>
+                          <p:cTn id="28" fill="hold">
+                            <p:stCondLst>
+                              <p:cond delay="0"/>
+                            </p:stCondLst>
+                            <p:childTnLst>
+                              <p:par>
+                                <p:cTn id="29" presetID="1" presetClass="entr" presetSubtype="0" fill="hold" nodeType="clickEffect">
                                   <p:stCondLst>
                                     <p:cond delay="0"/>
                                   </p:stCondLst>
@@ -14083,7 +14126,7 @@
                                         <p:tgtEl>
                                           <p:spTgt spid="8">
                                             <p:txEl>
-                                              <p:pRg st="0" end="0"/>
+                                              <p:pRg st="2" end="2"/>
                                             </p:txEl>
                                           </p:spTgt>
                                         </p:tgtEl>
@@ -14117,7 +14160,7 @@
                             </p:stCondLst>
                             <p:childTnLst>
                               <p:par>
-                                <p:cTn id="33" presetID="1" presetClass="entr" presetSubtype="0" fill="hold" nodeType="clickEffect">
+                                <p:cTn id="33" presetID="1" presetClass="entr" presetSubtype="0" fill="hold" grpId="1" nodeType="clickEffect">
                                   <p:stCondLst>
                                     <p:cond delay="0"/>
                                   </p:stCondLst>
@@ -14125,104 +14168,6 @@
                                     <p:set>
                                       <p:cBhvr>
                                         <p:cTn id="34" dur="1" fill="hold">
-                                          <p:stCondLst>
-                                            <p:cond delay="0"/>
-                                          </p:stCondLst>
-                                        </p:cTn>
-                                        <p:tgtEl>
-                                          <p:spTgt spid="8">
-                                            <p:txEl>
-                                              <p:pRg st="1" end="1"/>
-                                            </p:txEl>
-                                          </p:spTgt>
-                                        </p:tgtEl>
-                                        <p:attrNameLst>
-                                          <p:attrName>style.visibility</p:attrName>
-                                        </p:attrNameLst>
-                                      </p:cBhvr>
-                                      <p:to>
-                                        <p:strVal val="visible"/>
-                                      </p:to>
-                                    </p:set>
-                                  </p:childTnLst>
-                                </p:cTn>
-                              </p:par>
-                            </p:childTnLst>
-                          </p:cTn>
-                        </p:par>
-                      </p:childTnLst>
-                    </p:cTn>
-                  </p:par>
-                  <p:par>
-                    <p:cTn id="35" fill="hold">
-                      <p:stCondLst>
-                        <p:cond delay="indefinite"/>
-                      </p:stCondLst>
-                      <p:childTnLst>
-                        <p:par>
-                          <p:cTn id="36" fill="hold">
-                            <p:stCondLst>
-                              <p:cond delay="0"/>
-                            </p:stCondLst>
-                            <p:childTnLst>
-                              <p:par>
-                                <p:cTn id="37" presetID="1" presetClass="entr" presetSubtype="0" fill="hold" nodeType="clickEffect">
-                                  <p:stCondLst>
-                                    <p:cond delay="0"/>
-                                  </p:stCondLst>
-                                  <p:childTnLst>
-                                    <p:set>
-                                      <p:cBhvr>
-                                        <p:cTn id="38" dur="1" fill="hold">
-                                          <p:stCondLst>
-                                            <p:cond delay="0"/>
-                                          </p:stCondLst>
-                                        </p:cTn>
-                                        <p:tgtEl>
-                                          <p:spTgt spid="8">
-                                            <p:txEl>
-                                              <p:pRg st="2" end="2"/>
-                                            </p:txEl>
-                                          </p:spTgt>
-                                        </p:tgtEl>
-                                        <p:attrNameLst>
-                                          <p:attrName>style.visibility</p:attrName>
-                                        </p:attrNameLst>
-                                      </p:cBhvr>
-                                      <p:to>
-                                        <p:strVal val="visible"/>
-                                      </p:to>
-                                    </p:set>
-                                  </p:childTnLst>
-                                </p:cTn>
-                              </p:par>
-                            </p:childTnLst>
-                          </p:cTn>
-                        </p:par>
-                      </p:childTnLst>
-                    </p:cTn>
-                  </p:par>
-                  <p:par>
-                    <p:cTn id="39" fill="hold">
-                      <p:stCondLst>
-                        <p:cond delay="indefinite"/>
-                      </p:stCondLst>
-                      <p:childTnLst>
-                        <p:par>
-                          <p:cTn id="40" fill="hold">
-                            <p:stCondLst>
-                              <p:cond delay="0"/>
-                            </p:stCondLst>
-                            <p:childTnLst>
-                              <p:par>
-                                <p:cTn id="41" presetID="1" presetClass="entr" presetSubtype="0" fill="hold" grpId="1" nodeType="clickEffect">
-                                  <p:stCondLst>
-                                    <p:cond delay="0"/>
-                                  </p:stCondLst>
-                                  <p:childTnLst>
-                                    <p:set>
-                                      <p:cBhvr>
-                                        <p:cTn id="42" dur="1" fill="hold">
                                           <p:stCondLst>
                                             <p:cond delay="0"/>
                                           </p:stCondLst>
@@ -14269,7 +14214,7 @@
       </p:par>
     </p:tnLst>
     <p:bldLst>
-      <p:bldP spid="7" grpId="0" uiExpand="1" build="p" animBg="1"/>
+      <p:bldP spid="7" grpId="0" uiExpand="1" build="p"/>
       <p:bldP spid="8" grpId="0" animBg="1"/>
       <p:bldP spid="2" grpId="1"/>
       <p:bldP spid="10" grpId="1"/>
@@ -14526,21 +14471,33 @@
               <a:rPr lang="en-US" sz="3600" dirty="0">
                 <a:cs typeface="Calibri"/>
               </a:rPr>
-              <a:t>Даден ви е </a:t>
-            </a:r>
-            <a:r>
-              <a:rPr lang="en-US" sz="3600" b="1" dirty="0">
-                <a:solidFill>
-                  <a:schemeClr val="bg1"/>
-                </a:solidFill>
+              <a:t>Даден</a:t>
+            </a:r>
+            <a:r>
+              <a:rPr lang="bg-BG" sz="3600" dirty="0">
                 <a:cs typeface="Calibri"/>
               </a:rPr>
-              <a:t>текст</a:t>
+              <a:t>и са</a:t>
             </a:r>
             <a:r>
               <a:rPr lang="en-US" sz="3600" dirty="0">
                 <a:cs typeface="Calibri"/>
               </a:rPr>
+              <a:t> ви </a:t>
+            </a:r>
+            <a:r>
+              <a:rPr lang="en-US" sz="3600" b="1" dirty="0">
+                <a:solidFill>
+                  <a:schemeClr val="bg1"/>
+                </a:solidFill>
+                <a:cs typeface="Calibri"/>
+              </a:rPr>
+              <a:t>текст</a:t>
+            </a:r>
+            <a:r>
+              <a:rPr lang="en-US" sz="3600" dirty="0">
+                <a:cs typeface="Calibri"/>
+              </a:rPr>
               <a:t> и </a:t>
             </a:r>
             <a:r>
@@ -14589,7 +14546,13 @@
                 </a:solidFill>
                 <a:cs typeface="Calibri"/>
               </a:rPr>
-              <a:t>еднакви с</a:t>
+              <a:t>еднакви </a:t>
+            </a:r>
+            <a:r>
+              <a:rPr lang="en-US" sz="3600" dirty="0">
+                <a:cs typeface="Calibri"/>
+              </a:rPr>
+              <a:t>с</a:t>
             </a:r>
             <a:br>
               <a:rPr lang="en-US" sz="3600" b="1" dirty="0">
@@ -14686,7 +14649,7 @@
         </p:nvSpPr>
         <p:spPr>
           <a:xfrm>
-            <a:off x="3674260" y="3793847"/>
+            <a:off x="3677397" y="3793847"/>
             <a:ext cx="536637" cy="422049"/>
           </a:xfrm>
           <a:prstGeom prst="rightArrow">
@@ -14877,7 +14840,7 @@
         </p:nvSpPr>
         <p:spPr>
           <a:xfrm>
-            <a:off x="3674260" y="5269541"/>
+            <a:off x="3644180" y="5269541"/>
             <a:ext cx="536637" cy="422049"/>
           </a:xfrm>
           <a:prstGeom prst="rightArrow">
@@ -15068,7 +15031,7 @@
         </p:nvSpPr>
         <p:spPr>
           <a:xfrm>
-            <a:off x="9654266" y="3789286"/>
+            <a:off x="9713498" y="3789286"/>
             <a:ext cx="536637" cy="422049"/>
           </a:xfrm>
           <a:prstGeom prst="rightArrow">
@@ -15259,7 +15222,7 @@
         </p:nvSpPr>
         <p:spPr>
           <a:xfrm>
-            <a:off x="9782154" y="5273213"/>
+            <a:off x="9731096" y="5273213"/>
             <a:ext cx="536637" cy="422049"/>
           </a:xfrm>
           <a:prstGeom prst="rightArrow">
@@ -15585,35 +15548,26 @@
                                   </p:childTnLst>
                                 </p:cTn>
                               </p:par>
+                            </p:childTnLst>
+                          </p:cTn>
+                        </p:par>
+                      </p:childTnLst>
+                    </p:cTn>
+                  </p:par>
+                  <p:par>
+                    <p:cTn id="15" fill="hold">
+                      <p:stCondLst>
+                        <p:cond delay="indefinite"/>
+                      </p:stCondLst>
+                      <p:childTnLst>
+                        <p:par>
+                          <p:cTn id="16" fill="hold">
+                            <p:stCondLst>
+                              <p:cond delay="0"/>
+                            </p:stCondLst>
+                            <p:childTnLst>
                               <p:par>
-                                <p:cTn id="15" presetID="1" presetClass="entr" presetSubtype="0" fill="hold" grpId="0" nodeType="withEffect">
-                                  <p:stCondLst>
-                                    <p:cond delay="0"/>
-                                  </p:stCondLst>
-                                  <p:childTnLst>
-                                    <p:set>
-                                      <p:cBhvr>
-                                        <p:cTn id="16" dur="1" fill="hold">
-                                          <p:stCondLst>
-                                            <p:cond delay="0"/>
-                                          </p:stCondLst>
-                                        </p:cTn>
-                                        <p:tgtEl>
-                                          <p:spTgt spid="10"/>
-                                        </p:tgtEl>
-                                        <p:attrNameLst>
-                                          <p:attrName>style.visibility</p:attrName>
-                                        </p:attrNameLst>
-                                      </p:cBhvr>
-                                      <p:to>
-                                        <p:strVal val="visible"/>
-                                      </p:to>
-                                    </p:set>
-                                  </p:childTnLst>
-                                </p:cTn>
-                              </p:par>
-                              <p:par>
-                                <p:cTn id="17" presetID="1" presetClass="entr" presetSubtype="0" fill="hold" grpId="0" nodeType="withEffect">
+                                <p:cTn id="17" presetID="1" presetClass="entr" presetSubtype="0" fill="hold" grpId="0" nodeType="clickEffect">
                                   <p:stCondLst>
                                     <p:cond delay="0"/>
                                   </p:stCondLst>
@@ -15626,7 +15580,7 @@
                                           </p:stCondLst>
                                         </p:cTn>
                                         <p:tgtEl>
-                                          <p:spTgt spid="11"/>
+                                          <p:spTgt spid="10"/>
                                         </p:tgtEl>
                                         <p:attrNameLst>
                                           <p:attrName>style.visibility</p:attrName>
@@ -15653,7 +15607,7 @@
                                           </p:stCondLst>
                                         </p:cTn>
                                         <p:tgtEl>
-                                          <p:spTgt spid="12"/>
+                                          <p:spTgt spid="11"/>
                                         </p:tgtEl>
                                         <p:attrNameLst>
                                           <p:attrName>style.visibility</p:attrName>
@@ -15680,7 +15634,7 @@
                                           </p:stCondLst>
                                         </p:cTn>
                                         <p:tgtEl>
-                                          <p:spTgt spid="34"/>
+                                          <p:spTgt spid="12"/>
                                         </p:tgtEl>
                                         <p:attrNameLst>
                                           <p:attrName>style.visibility</p:attrName>
@@ -15693,35 +15647,26 @@
                                   </p:childTnLst>
                                 </p:cTn>
                               </p:par>
+                            </p:childTnLst>
+                          </p:cTn>
+                        </p:par>
+                      </p:childTnLst>
+                    </p:cTn>
+                  </p:par>
+                  <p:par>
+                    <p:cTn id="23" fill="hold">
+                      <p:stCondLst>
+                        <p:cond delay="indefinite"/>
+                      </p:stCondLst>
+                      <p:childTnLst>
+                        <p:par>
+                          <p:cTn id="24" fill="hold">
+                            <p:stCondLst>
+                              <p:cond delay="0"/>
+                            </p:stCondLst>
+                            <p:childTnLst>
                               <p:par>
-                                <p:cTn id="23" presetID="1" presetClass="entr" presetSubtype="0" fill="hold" grpId="0" nodeType="withEffect">
-                                  <p:stCondLst>
-                                    <p:cond delay="0"/>
-                                  </p:stCondLst>
-                                  <p:childTnLst>
-                                    <p:set>
-                                      <p:cBhvr>
-                                        <p:cTn id="24" dur="1" fill="hold">
-                                          <p:stCondLst>
-                                            <p:cond delay="0"/>
-                                          </p:stCondLst>
-                                        </p:cTn>
-                                        <p:tgtEl>
-                                          <p:spTgt spid="37"/>
-                                        </p:tgtEl>
-                                        <p:attrNameLst>
-                                          <p:attrName>style.visibility</p:attrName>
-                                        </p:attrNameLst>
-                                      </p:cBhvr>
-                                      <p:to>
-                                        <p:strVal val="visible"/>
-                                      </p:to>
-                                    </p:set>
-                                  </p:childTnLst>
-                                </p:cTn>
-                              </p:par>
-                              <p:par>
-                                <p:cTn id="25" presetID="1" presetClass="entr" presetSubtype="0" fill="hold" grpId="0" nodeType="withEffect">
+                                <p:cTn id="25" presetID="1" presetClass="entr" presetSubtype="0" fill="hold" grpId="0" nodeType="clickEffect">
                                   <p:stCondLst>
                                     <p:cond delay="0"/>
                                   </p:stCondLst>
@@ -15734,7 +15679,7 @@
                                           </p:stCondLst>
                                         </p:cTn>
                                         <p:tgtEl>
-                                          <p:spTgt spid="38"/>
+                                          <p:spTgt spid="34"/>
                                         </p:tgtEl>
                                         <p:attrNameLst>
                                           <p:attrName>style.visibility</p:attrName>
@@ -15801,15 +15746,87 @@
                                   </p:childTnLst>
                                 </p:cTn>
                               </p:par>
+                            </p:childTnLst>
+                          </p:cTn>
+                        </p:par>
+                      </p:childTnLst>
+                    </p:cTn>
+                  </p:par>
+                  <p:par>
+                    <p:cTn id="31" fill="hold">
+                      <p:stCondLst>
+                        <p:cond delay="indefinite"/>
+                      </p:stCondLst>
+                      <p:childTnLst>
+                        <p:par>
+                          <p:cTn id="32" fill="hold">
+                            <p:stCondLst>
+                              <p:cond delay="0"/>
+                            </p:stCondLst>
+                            <p:childTnLst>
                               <p:par>
-                                <p:cTn id="31" presetID="1" presetClass="entr" presetSubtype="0" fill="hold" grpId="0" nodeType="withEffect">
+                                <p:cTn id="33" presetID="1" presetClass="entr" presetSubtype="0" fill="hold" grpId="0" nodeType="clickEffect">
                                   <p:stCondLst>
                                     <p:cond delay="0"/>
                                   </p:stCondLst>
                                   <p:childTnLst>
                                     <p:set>
                                       <p:cBhvr>
-                                        <p:cTn id="32" dur="1" fill="hold">
+                                        <p:cTn id="34" dur="1" fill="hold">
+                                          <p:stCondLst>
+                                            <p:cond delay="0"/>
+                                          </p:stCondLst>
+                                        </p:cTn>
+                                        <p:tgtEl>
+                                          <p:spTgt spid="37"/>
+                                        </p:tgtEl>
+                                        <p:attrNameLst>
+                                          <p:attrName>style.visibility</p:attrName>
+                                        </p:attrNameLst>
+                                      </p:cBhvr>
+                                      <p:to>
+                                        <p:strVal val="visible"/>
+                                      </p:to>
+                                    </p:set>
+                                  </p:childTnLst>
+                                </p:cTn>
+                              </p:par>
+                              <p:par>
+                                <p:cTn id="35" presetID="1" presetClass="entr" presetSubtype="0" fill="hold" grpId="0" nodeType="withEffect">
+                                  <p:stCondLst>
+                                    <p:cond delay="0"/>
+                                  </p:stCondLst>
+                                  <p:childTnLst>
+                                    <p:set>
+                                      <p:cBhvr>
+                                        <p:cTn id="36" dur="1" fill="hold">
+                                          <p:stCondLst>
+                                            <p:cond delay="0"/>
+                                          </p:stCondLst>
+                                        </p:cTn>
+                                        <p:tgtEl>
+                                          <p:spTgt spid="38"/>
+                                        </p:tgtEl>
+                                        <p:attrNameLst>
+                                          <p:attrName>style.visibility</p:attrName>
+                                        </p:attrNameLst>
+                                      </p:cBhvr>
+                                      <p:to>
+                                        <p:strVal val="visible"/>
+                                      </p:to>
+                                    </p:set>
+                                  </p:childTnLst>
+                                </p:cTn>
+                              </p:par>
+                              <p:par>
+                                <p:cTn id="37" presetID="1" presetClass="entr" presetSubtype="0" fill="hold" grpId="0" nodeType="withEffect">
+                                  <p:stCondLst>
+                                    <p:cond delay="0"/>
+                                  </p:stCondLst>
+                                  <p:childTnLst>
+                                    <p:set>
+                                      <p:cBhvr>
+                                        <p:cTn id="38" dur="1" fill="hold">
                                           <p:stCondLst>
                                             <p:cond delay="0"/>
                                           </p:stCondLst>
@@ -16291,7 +16308,7 @@
             <a:pPr algn="ctr"/>
             <a:r>
               <a:rPr lang="bg-BG" sz="1999" dirty="0"/>
-              <a:t>Проверете решението тук</a:t>
+              <a:t>Проверете решението си тук</a:t>
             </a:r>
             <a:r>
               <a:rPr lang="en-US" sz="1999" dirty="0"/>
@@ -16751,8 +16768,12 @@
               </a:buClr>
             </a:pPr>
             <a:r>
+              <a:rPr lang="bg-BG" sz="3600" dirty="0"/>
+              <a:t>Методът</a:t>
+            </a:r>
+            <a:r>
               <a:rPr lang="en-US" sz="3600" dirty="0"/>
-              <a:t>Командата </a:t>
+              <a:t> </a:t>
             </a:r>
             <a:r>
               <a:rPr lang="en-US" sz="3600" b="1" dirty="0">
@@ -17637,6 +17658,8 @@
                 <a:solidFill>
                   <a:schemeClr val="bg1"/>
                 </a:solidFill>
+                <a:latin typeface="Consolas" panose="020B0609020204030204" pitchFamily="49" charset="0"/>
+                <a:cs typeface="Consolas" panose="020B0609020204030204" pitchFamily="49" charset="0"/>
               </a:rPr>
               <a:t>Split</a:t>
             </a:r>
@@ -17645,6 +17668,8 @@
                 <a:solidFill>
                   <a:schemeClr val="bg1"/>
                 </a:solidFill>
+                <a:latin typeface="Consolas" panose="020B0609020204030204" pitchFamily="49" charset="0"/>
+                <a:cs typeface="Consolas" panose="020B0609020204030204" pitchFamily="49" charset="0"/>
               </a:rPr>
               <a:t>()</a:t>
             </a:r>
@@ -18494,8 +18519,12 @@
           <a:lstStyle/>
           <a:p>
             <a:r>
+              <a:rPr lang="bg-BG" dirty="0"/>
+              <a:t>Разделяне</a:t>
+            </a:r>
+            <a:r>
               <a:rPr lang="en-GB" dirty="0"/>
-              <a:t>Splitting (3)</a:t>
+              <a:t> (3)</a:t>
             </a:r>
             <a:endParaRPr lang="bg-BG" dirty="0"/>
           </a:p>
@@ -19278,12 +19307,20 @@
               </a:buClr>
             </a:pPr>
             <a:r>
-              <a:rPr lang="en-GB" b="1" dirty="0">
+              <a:rPr lang="bg-BG" dirty="0">
                 <a:solidFill>
                   <a:schemeClr val="bg1"/>
                 </a:solidFill>
               </a:rPr>
-              <a:t>Маниполация</a:t>
+              <a:t>͏</a:t>
+            </a:r>
+            <a:r>
+              <a:rPr lang="bg-BG" b="1" dirty="0">
+                <a:solidFill>
+                  <a:schemeClr val="bg1"/>
+                </a:solidFill>
+              </a:rPr>
+              <a:t>Манипулация</a:t>
             </a:r>
             <a:r>
               <a:rPr lang="en-GB" dirty="0"/>
@@ -19296,22 +19333,18 @@
             </a:endParaRPr>
           </a:p>
           <a:p>
-            <a:pPr>
-              <a:buClr>
-                <a:schemeClr val="tx1"/>
-              </a:buClr>
-            </a:pPr>
-            <a:r>
-              <a:rPr lang="en-GB" b="1" dirty="0">
-                <a:solidFill>
-                  <a:schemeClr val="bg1"/>
-                </a:solidFill>
-              </a:rPr>
-              <a:t>Маниполация</a:t>
-            </a:r>
+            <a:pPr lvl="1" indent="-360045"/>
             <a:r>
               <a:rPr lang="en-GB" dirty="0"/>
-              <a:t> на низ</a:t>
+              <a:t>Търсене</a:t>
+            </a:r>
+            <a:r>
+              <a:rPr lang="bg-BG" dirty="0"/>
+              <a:t> на</a:t>
+            </a:r>
+            <a:r>
+              <a:rPr lang="en-GB" dirty="0"/>
+              <a:t> подниз</a:t>
             </a:r>
             <a:endParaRPr lang="en-GB" dirty="0">
               <a:cs typeface="Calibri"/>
@@ -19321,17 +19354,15 @@
             <a:pPr lvl="1" indent="-360045"/>
             <a:r>
               <a:rPr lang="en-GB" dirty="0"/>
-              <a:t>Търсене, подниз</a:t>
-            </a:r>
-            <a:endParaRPr lang="en-GB" dirty="0">
-              <a:cs typeface="Calibri"/>
-            </a:endParaRPr>
+              <a:t>Разделяне</a:t>
+            </a:r>
+            <a:endParaRPr lang="bg-BG" dirty="0"/>
           </a:p>
           <a:p>
             <a:pPr lvl="1" indent="-360045"/>
             <a:r>
-              <a:rPr lang="en-GB" dirty="0"/>
-              <a:t>Разделяне, заместване</a:t>
+              <a:rPr lang="bg-BG" dirty="0"/>
+              <a:t>Заместване в низ</a:t>
             </a:r>
             <a:endParaRPr lang="en-GB" dirty="0">
               <a:cs typeface="Calibri"/>
@@ -19344,6 +19375,14 @@
               </a:buClr>
             </a:pPr>
             <a:r>
+              <a:rPr lang="bg-BG" dirty="0">
+                <a:solidFill>
+                  <a:schemeClr val="bg1"/>
+                </a:solidFill>
+              </a:rPr>
+              <a:t>͏</a:t>
+            </a:r>
+            <a:r>
               <a:rPr lang="en-GB" b="1" dirty="0">
                 <a:solidFill>
                   <a:schemeClr val="bg1"/>
@@ -19382,22 +19421,16 @@
           <a:p>
             <a:pPr lvl="1" indent="-360045"/>
             <a:r>
-              <a:rPr lang="en-GB" dirty="0"/>
-              <a:t>Чрез класа</a:t>
-            </a:r>
-            <a:r>
-              <a:rPr lang="en-GB" dirty="0">
-                <a:solidFill>
-                  <a:srgbClr val="234465"/>
-                </a:solidFill>
-              </a:rPr>
-              <a:t> </a:t>
+              <a:rPr lang="bg-BG" dirty="0"/>
+              <a:t>Класът </a:t>
             </a:r>
             <a:r>
               <a:rPr lang="en-GB" b="1" noProof="1">
                 <a:solidFill>
                   <a:schemeClr val="bg1"/>
                 </a:solidFill>
+                <a:latin typeface="Consolas" panose="020B0609020204030204" pitchFamily="49" charset="0"/>
+                <a:cs typeface="Consolas" panose="020B0609020204030204" pitchFamily="49" charset="0"/>
               </a:rPr>
               <a:t>StringBuilder</a:t>
             </a:r>
@@ -19405,7 +19438,8 @@
               <a:solidFill>
                 <a:schemeClr val="bg1"/>
               </a:solidFill>
-              <a:cs typeface="Calibri"/>
+              <a:latin typeface="Consolas" panose="020B0609020204030204" pitchFamily="49" charset="0"/>
+              <a:cs typeface="Consolas" panose="020B0609020204030204" pitchFamily="49" charset="0"/>
             </a:endParaRPr>
           </a:p>
           <a:p>
@@ -19446,13 +19480,13 @@
           <a:lstStyle/>
           <a:p>
             <a:r>
-              <a:rPr lang="en-GB" sz="3950" dirty="0">
+              <a:rPr lang="en-GB" sz="4000" dirty="0">
                 <a:ea typeface="+mj-lt"/>
                 <a:cs typeface="+mj-lt"/>
               </a:rPr>
               <a:t>Съдържание</a:t>
             </a:r>
-            <a:endParaRPr lang="bg-BG" dirty="0"/>
+            <a:endParaRPr lang="bg-BG" sz="4000" dirty="0"/>
           </a:p>
         </p:txBody>
       </p:sp>
@@ -19616,9 +19650,6 @@
                     <p:cTn id="3" fill="hold">
                       <p:stCondLst>
                         <p:cond delay="indefinite"/>
-                        <p:cond evt="onBegin" delay="0">
-                          <p:tn val="2"/>
-                        </p:cond>
                       </p:stCondLst>
                       <p:childTnLst>
                         <p:par>
@@ -19628,7 +19659,7 @@
                             </p:stCondLst>
                             <p:childTnLst>
                               <p:par>
-                                <p:cTn id="5" presetID="1" presetClass="entr" presetSubtype="0" fill="hold" nodeType="withEffect">
+                                <p:cTn id="5" presetID="1" presetClass="entr" presetSubtype="0" fill="hold" nodeType="clickEffect">
                                   <p:stCondLst>
                                     <p:cond delay="0"/>
                                   </p:stCondLst>
@@ -19636,6 +19667,86 @@
                                     <p:set>
                                       <p:cBhvr>
                                         <p:cTn id="6" dur="1" fill="hold">
+                                          <p:stCondLst>
+                                            <p:cond delay="0"/>
+                                          </p:stCondLst>
+                                        </p:cTn>
+                                        <p:tgtEl>
+                                          <p:spTgt spid="3">
+                                            <p:txEl>
+                                              <p:pRg st="1" end="1"/>
+                                            </p:txEl>
+                                          </p:spTgt>
+                                        </p:tgtEl>
+                                        <p:attrNameLst>
+                                          <p:attrName>style.visibility</p:attrName>
+                                        </p:attrNameLst>
+                                      </p:cBhvr>
+                                      <p:to>
+                                        <p:strVal val="visible"/>
+                                      </p:to>
+                                    </p:set>
+                                  </p:childTnLst>
+                                </p:cTn>
+                              </p:par>
+                              <p:par>
+                                <p:cTn id="7" presetID="1" presetClass="entr" presetSubtype="0" fill="hold" nodeType="withEffect">
+                                  <p:stCondLst>
+                                    <p:cond delay="0"/>
+                                  </p:stCondLst>
+                                  <p:childTnLst>
+                                    <p:set>
+                                      <p:cBhvr>
+                                        <p:cTn id="8" dur="1" fill="hold">
+                                          <p:stCondLst>
+                                            <p:cond delay="0"/>
+                                          </p:stCondLst>
+                                        </p:cTn>
+                                        <p:tgtEl>
+                                          <p:spTgt spid="3">
+                                            <p:txEl>
+                                              <p:pRg st="2" end="2"/>
+                                            </p:txEl>
+                                          </p:spTgt>
+                                        </p:tgtEl>
+                                        <p:attrNameLst>
+                                          <p:attrName>style.visibility</p:attrName>
+                                        </p:attrNameLst>
+                                      </p:cBhvr>
+                                      <p:to>
+                                        <p:strVal val="visible"/>
+                                      </p:to>
+                                    </p:set>
+                                  </p:childTnLst>
+                                </p:cTn>
+                              </p:par>
+                            </p:childTnLst>
+                          </p:cTn>
+                        </p:par>
+                      </p:childTnLst>
+                    </p:cTn>
+                  </p:par>
+                  <p:par>
+                    <p:cTn id="9" fill="hold">
+                      <p:stCondLst>
+                        <p:cond delay="indefinite"/>
+                      </p:stCondLst>
+                      <p:childTnLst>
+                        <p:par>
+                          <p:cTn id="10" fill="hold">
+                            <p:stCondLst>
+                              <p:cond delay="0"/>
+                            </p:stCondLst>
+                            <p:childTnLst>
+                              <p:par>
+                                <p:cTn id="11" presetID="1" presetClass="entr" presetSubtype="0" fill="hold" nodeType="clickEffect">
+                                  <p:stCondLst>
+                                    <p:cond delay="0"/>
+                                  </p:stCondLst>
+                                  <p:childTnLst>
+                                    <p:set>
+                                      <p:cBhvr>
+                                        <p:cTn id="12" dur="1" fill="hold">
                                           <p:stCondLst>
                                             <p:cond delay="0"/>
                                           </p:stCondLst>
@@ -19665,26 +19776,26 @@
                     </p:cTn>
                   </p:par>
                   <p:par>
-                    <p:cTn id="7" fill="hold">
+                    <p:cTn id="13" fill="hold">
                       <p:stCondLst>
                         <p:cond delay="indefinite"/>
                       </p:stCondLst>
                       <p:childTnLst>
                         <p:par>
-                          <p:cTn id="8" fill="hold">
+                          <p:cTn id="14" fill="hold">
                             <p:stCondLst>
                               <p:cond delay="0"/>
                             </p:stCondLst>
                             <p:childTnLst>
                               <p:par>
-                                <p:cTn id="9" presetID="1" presetClass="entr" presetSubtype="0" fill="hold" nodeType="clickEffect">
+                                <p:cTn id="15" presetID="1" presetClass="entr" presetSubtype="0" fill="hold" nodeType="clickEffect">
                                   <p:stCondLst>
                                     <p:cond delay="0"/>
                                   </p:stCondLst>
                                   <p:childTnLst>
                                     <p:set>
                                       <p:cBhvr>
-                                        <p:cTn id="10" dur="1" fill="hold">
+                                        <p:cTn id="16" dur="1" fill="hold">
                                           <p:stCondLst>
                                             <p:cond delay="0"/>
                                           </p:stCondLst>
@@ -19714,26 +19825,26 @@
                     </p:cTn>
                   </p:par>
                   <p:par>
-                    <p:cTn id="11" fill="hold">
+                    <p:cTn id="17" fill="hold">
                       <p:stCondLst>
                         <p:cond delay="indefinite"/>
                       </p:stCondLst>
                       <p:childTnLst>
                         <p:par>
-                          <p:cTn id="12" fill="hold">
+                          <p:cTn id="18" fill="hold">
                             <p:stCondLst>
                               <p:cond delay="0"/>
                             </p:stCondLst>
                             <p:childTnLst>
                               <p:par>
-                                <p:cTn id="13" presetID="1" presetClass="entr" presetSubtype="0" fill="hold" nodeType="clickEffect">
+                                <p:cTn id="19" presetID="1" presetClass="entr" presetSubtype="0" fill="hold" nodeType="clickEffect">
                                   <p:stCondLst>
                                     <p:cond delay="0"/>
                                   </p:stCondLst>
                                   <p:childTnLst>
                                     <p:set>
                                       <p:cBhvr>
-                                        <p:cTn id="14" dur="1" fill="hold">
+                                        <p:cTn id="20" dur="1" fill="hold">
                                           <p:stCondLst>
                                             <p:cond delay="0"/>
                                           </p:stCondLst>
@@ -19757,14 +19868,14 @@
                                 </p:cTn>
                               </p:par>
                               <p:par>
-                                <p:cTn id="15" presetID="1" presetClass="entr" presetSubtype="0" fill="hold" nodeType="withEffect">
+                                <p:cTn id="21" presetID="1" presetClass="entr" presetSubtype="0" fill="hold" nodeType="withEffect">
                                   <p:stCondLst>
                                     <p:cond delay="0"/>
                                   </p:stCondLst>
                                   <p:childTnLst>
                                     <p:set>
                                       <p:cBhvr>
-                                        <p:cTn id="16" dur="1" fill="hold">
+                                        <p:cTn id="22" dur="1" fill="hold">
                                           <p:stCondLst>
                                             <p:cond delay="0"/>
                                           </p:stCondLst>
@@ -19864,7 +19975,7 @@
               </a:buClr>
             </a:pPr>
             <a:r>
-              <a:rPr lang="en-US" sz="3350" b="1" dirty="0">
+              <a:rPr lang="en-US" sz="3400" b="1" dirty="0">
                 <a:solidFill>
                   <a:schemeClr val="bg1"/>
                 </a:solidFill>
@@ -19873,13 +19984,13 @@
               <a:t>Replace</a:t>
             </a:r>
             <a:r>
-              <a:rPr lang="en-US" sz="3350" dirty="0">
+              <a:rPr lang="en-US" sz="3400" dirty="0">
                 <a:latin typeface="Consolas"/>
               </a:rPr>
               <a:t>(</a:t>
             </a:r>
             <a:r>
-              <a:rPr lang="en-US" sz="3350" b="1" dirty="0">
+              <a:rPr lang="en-US" sz="3400" b="1" dirty="0">
                 <a:solidFill>
                   <a:schemeClr val="bg1"/>
                 </a:solidFill>
@@ -19888,7 +19999,7 @@
               <a:t>стара стойност, нова стойност</a:t>
             </a:r>
             <a:r>
-              <a:rPr lang="en-US" sz="3350" dirty="0">
+              <a:rPr lang="en-US" sz="3400" dirty="0">
                 <a:solidFill>
                   <a:srgbClr val="234465"/>
                 </a:solidFill>
@@ -19897,7 +20008,7 @@
               <a:t>)</a:t>
             </a:r>
             <a:r>
-              <a:rPr lang="en-US" sz="3350" b="1" dirty="0">
+              <a:rPr lang="en-US" sz="3400" b="1" dirty="0">
                 <a:solidFill>
                   <a:schemeClr val="bg1"/>
                 </a:solidFill>
@@ -19905,18 +20016,17 @@
               <a:t> </a:t>
             </a:r>
             <a:r>
-              <a:rPr lang="en-US" sz="3350" dirty="0"/>
+              <a:rPr lang="en-US" sz="3400" dirty="0"/>
               <a:t>–</a:t>
             </a:r>
             <a:r>
-              <a:rPr lang="bg-BG" sz="3350" dirty="0"/>
+              <a:rPr lang="bg-BG" sz="3400" dirty="0"/>
               <a:t> </a:t>
             </a:r>
             <a:r>
-              <a:rPr lang="en-US" sz="3350" dirty="0"/>
+              <a:rPr lang="en-US" sz="3400" dirty="0"/>
               <a:t>заменя всички стари стойности с нова стойност</a:t>
             </a:r>
-            <a:endParaRPr lang="en-US" dirty="0"/>
           </a:p>
           <a:p>
             <a:pPr marL="1066165" lvl="1" indent="-457200">
@@ -19925,18 +20035,34 @@
               </a:buClr>
             </a:pPr>
             <a:r>
-              <a:rPr lang="en-US" sz="3150" dirty="0"/>
-              <a:t>Резултатът връща нов </a:t>
-            </a:r>
-            <a:r>
-              <a:rPr lang="en-US" sz="3150" b="1" dirty="0">
+              <a:rPr lang="bg-BG" sz="3200" dirty="0"/>
+              <a:t>Връща</a:t>
+            </a:r>
+            <a:r>
+              <a:rPr lang="en-US" sz="3200" dirty="0"/>
+              <a:t> </a:t>
+            </a:r>
+            <a:r>
+              <a:rPr lang="en-US" sz="3200" b="1" dirty="0">
                 <a:solidFill>
                   <a:schemeClr val="bg1"/>
                 </a:solidFill>
               </a:rPr>
+              <a:t>нов</a:t>
+            </a:r>
+            <a:r>
+              <a:rPr lang="en-US" sz="3200" dirty="0"/>
+              <a:t> </a:t>
+            </a:r>
+            <a:r>
+              <a:rPr lang="en-US" sz="3200" b="1" dirty="0">
+                <a:solidFill>
+                  <a:schemeClr val="bg1"/>
+                </a:solidFill>
+              </a:rPr>
               <a:t>низ</a:t>
             </a:r>
-            <a:endParaRPr lang="en-US" sz="3150" b="1" dirty="0">
+            <a:endParaRPr lang="en-US" sz="3200" b="1" dirty="0">
               <a:solidFill>
                 <a:schemeClr val="bg1"/>
               </a:solidFill>
@@ -20914,34 +21040,49 @@
           <a:p>
             <a:pPr marL="456565" indent="-456565"/>
             <a:r>
-              <a:rPr lang="en-US" sz="3350" dirty="0">
+              <a:rPr lang="en-US" sz="3400" dirty="0">
                 <a:cs typeface="Calibri"/>
               </a:rPr>
               <a:t>Даден ви е </a:t>
             </a:r>
             <a:r>
-              <a:rPr lang="en-US" sz="3350" b="1" dirty="0">
+              <a:rPr lang="bg-BG" sz="3400" b="1" dirty="0">
                 <a:solidFill>
                   <a:schemeClr val="bg1"/>
                 </a:solidFill>
                 <a:cs typeface="Calibri"/>
               </a:rPr>
-              <a:t>тескст </a:t>
-            </a:r>
-            <a:r>
-              <a:rPr lang="en-US" sz="3350" dirty="0">
+              <a:t>текст</a:t>
+            </a:r>
+            <a:r>
+              <a:rPr lang="en-US" sz="3400" b="1" dirty="0">
+                <a:solidFill>
+                  <a:schemeClr val="bg1"/>
+                </a:solidFill>
                 <a:cs typeface="Calibri"/>
               </a:rPr>
-              <a:t>и </a:t>
-            </a:r>
-            <a:r>
-              <a:rPr lang="en-US" sz="3350" b="1" dirty="0">
+              <a:t> </a:t>
+            </a:r>
+            <a:r>
+              <a:rPr lang="en-US" sz="3400" dirty="0">
+                <a:cs typeface="Calibri"/>
+              </a:rPr>
+              <a:t>и низ със</a:t>
+            </a:r>
+            <a:r>
+              <a:rPr lang="en-US" sz="3400" b="1" dirty="0">
+                <a:cs typeface="Calibri"/>
+              </a:rPr>
+              <a:t> </a:t>
+            </a:r>
+            <a:r>
+              <a:rPr lang="en-US" sz="3400" b="1" dirty="0">
                 <a:solidFill>
                   <a:schemeClr val="bg1"/>
                 </a:solidFill>
                 <a:cs typeface="Calibri"/>
               </a:rPr>
-              <a:t>низ със забранени думи</a:t>
+              <a:t>забранени думи</a:t>
             </a:r>
           </a:p>
           <a:p>
@@ -20951,7 +21092,7 @@
               </a:buClr>
             </a:pPr>
             <a:r>
-              <a:rPr lang="en-US" sz="3150" b="1" dirty="0">
+              <a:rPr lang="en-US" sz="3200" b="1" dirty="0">
                 <a:solidFill>
                   <a:schemeClr val="bg1"/>
                 </a:solidFill>
@@ -20960,7 +21101,7 @@
               <a:t>Заменет</a:t>
             </a:r>
             <a:r>
-              <a:rPr lang="bg-BG" sz="3150" b="1" dirty="0">
+              <a:rPr lang="bg-BG" sz="3200" b="1" dirty="0">
                 <a:solidFill>
                   <a:schemeClr val="bg1"/>
                 </a:solidFill>
@@ -20969,7 +21110,7 @@
               <a:t>е</a:t>
             </a:r>
             <a:r>
-              <a:rPr lang="en-US" sz="3150" dirty="0">
+              <a:rPr lang="en-US" sz="3200" dirty="0">
                 <a:solidFill>
                   <a:schemeClr val="bg1"/>
                 </a:solidFill>
@@ -20978,19 +21119,34 @@
               <a:t> </a:t>
             </a:r>
             <a:r>
-              <a:rPr lang="en-US" sz="3150" dirty="0">
+              <a:rPr lang="en-US" sz="3200" dirty="0">
                 <a:cs typeface="Calibri"/>
               </a:rPr>
               <a:t>всички </a:t>
             </a:r>
             <a:r>
-              <a:rPr lang="en-US" sz="3150" b="1" dirty="0">
+              <a:rPr lang="en-US" sz="3200" b="1" dirty="0">
                 <a:solidFill>
                   <a:schemeClr val="bg1"/>
                 </a:solidFill>
                 <a:cs typeface="Calibri"/>
               </a:rPr>
-              <a:t>забранени думи със звезди</a:t>
+              <a:t>забранени думи </a:t>
+            </a:r>
+            <a:r>
+              <a:rPr lang="en-US" sz="3200" dirty="0">
+                <a:cs typeface="Calibri"/>
+              </a:rPr>
+              <a:t>със</a:t>
+            </a:r>
+            <a:r>
+              <a:rPr lang="en-US" sz="3200" b="1" dirty="0">
+                <a:solidFill>
+                  <a:schemeClr val="bg1"/>
+                </a:solidFill>
+                <a:cs typeface="Calibri"/>
+              </a:rPr>
+              <a:t> звезди</a:t>
             </a:r>
           </a:p>
           <a:p>
@@ -21020,7 +21176,7 @@
         </p:nvSpPr>
         <p:spPr bwMode="auto">
           <a:xfrm>
-            <a:off x="1141047" y="3024000"/>
+            <a:off x="1141047" y="3005335"/>
             <a:ext cx="9909905" cy="1200016"/>
           </a:xfrm>
           <a:prstGeom prst="rect">
@@ -21088,7 +21244,7 @@
         </p:nvSpPr>
         <p:spPr>
           <a:xfrm rot="5400000">
-            <a:off x="5784372" y="4488821"/>
+            <a:off x="5784372" y="4470156"/>
             <a:ext cx="536637" cy="422049"/>
           </a:xfrm>
           <a:prstGeom prst="rightArrow">
@@ -21166,7 +21322,7 @@
         </p:nvSpPr>
         <p:spPr bwMode="auto">
           <a:xfrm>
-            <a:off x="1137093" y="5148806"/>
+            <a:off x="1137093" y="5130141"/>
             <a:ext cx="9903420" cy="953859"/>
           </a:xfrm>
           <a:prstGeom prst="rect">
@@ -21608,7 +21764,7 @@
                 <a:latin typeface="Consolas" pitchFamily="49" charset="0"/>
                 <a:cs typeface="Consolas" pitchFamily="49" charset="0"/>
               </a:rPr>
-              <a:t>добавете разделители</a:t>
+              <a:t>Добавете разделители</a:t>
             </a:r>
             <a:endParaRPr lang="en-US" sz="2399" b="1" i="1" noProof="1">
               <a:solidFill>
@@ -21883,13 +22039,13 @@
         </p:nvSpPr>
         <p:spPr bwMode="auto">
           <a:xfrm>
-            <a:off x="8269453" y="2349000"/>
-            <a:ext cx="3721547" cy="1895997"/>
+            <a:off x="7806001" y="2349000"/>
+            <a:ext cx="4185000" cy="1574999"/>
           </a:xfrm>
           <a:prstGeom prst="wedgeRoundRectCallout">
             <a:avLst>
-              <a:gd name="adj1" fmla="val -78341"/>
-              <a:gd name="adj2" fmla="val 7282"/>
+              <a:gd name="adj1" fmla="val -75144"/>
+              <a:gd name="adj2" fmla="val 15070"/>
               <a:gd name="adj3" fmla="val 16667"/>
             </a:avLst>
           </a:prstGeom>
@@ -21935,7 +22091,7 @@
           <a:p>
             <a:pPr algn="ctr"/>
             <a:r>
-              <a:rPr lang="en-US" sz="2750" b="1" noProof="1">
+              <a:rPr lang="en-US" sz="2800" b="1" noProof="1">
                 <a:solidFill>
                   <a:schemeClr val="bg1">
                     <a:lumMod val="60000"/>
@@ -21947,7 +22103,7 @@
               <a:t>Contains(…)</a:t>
             </a:r>
             <a:r>
-              <a:rPr lang="en-US" sz="2750" b="1" noProof="1">
+              <a:rPr lang="en-US" sz="2800" b="1" noProof="1">
                 <a:solidFill>
                   <a:schemeClr val="bg1">
                     <a:lumMod val="60000"/>
@@ -21958,7 +22114,7 @@
               <a:t> </a:t>
             </a:r>
             <a:r>
-              <a:rPr lang="en-US" sz="2750" b="1" noProof="1">
+              <a:rPr lang="en-US" sz="2800" b="1" noProof="1">
                 <a:solidFill>
                   <a:schemeClr val="bg2"/>
                 </a:solidFill>
@@ -21966,18 +22122,34 @@
               <a:t>проверява </a:t>
             </a:r>
             <a:r>
-              <a:rPr lang="en-US" sz="2750" b="1" noProof="1">
+              <a:rPr lang="en-US" sz="2800" b="1" noProof="1">
                 <a:solidFill>
                   <a:schemeClr val="bg2"/>
                 </a:solidFill>
                 <a:ea typeface="+mn-lt"/>
                 <a:cs typeface="+mn-lt"/>
               </a:rPr>
-              <a:t>дали в текста има забранена дума</a:t>
-            </a:r>
-            <a:endParaRPr lang="en-US" sz="2750" b="1" dirty="0">
+              <a:t>дали в текста има </a:t>
+            </a:r>
+            <a:r>
+              <a:rPr lang="en-US" sz="2800" b="1" noProof="1">
+                <a:solidFill>
+                  <a:schemeClr val="bg1">
+                    <a:lumMod val="60000"/>
+                    <a:lumOff val="40000"/>
+                  </a:schemeClr>
+                </a:solidFill>
+                <a:ea typeface="+mn-lt"/>
+                <a:cs typeface="+mn-lt"/>
+              </a:rPr>
+              <a:t>забранена дума</a:t>
+            </a:r>
+            <a:endParaRPr lang="en-US" sz="2800" b="1" dirty="0">
               <a:solidFill>
-                <a:schemeClr val="bg2"/>
+                <a:schemeClr val="bg1">
+                  <a:lumMod val="60000"/>
+                  <a:lumOff val="40000"/>
+                </a:schemeClr>
               </a:solidFill>
               <a:ea typeface="+mn-lt"/>
               <a:cs typeface="+mn-lt"/>
@@ -22053,7 +22225,7 @@
           <a:p>
             <a:pPr algn="ctr"/>
             <a:r>
-              <a:rPr lang="en-US" sz="2750" b="1" dirty="0">
+              <a:rPr lang="en-US" sz="2800" b="1" dirty="0">
                 <a:solidFill>
                   <a:schemeClr val="bg1">
                     <a:lumMod val="60000"/>
@@ -22064,16 +22236,30 @@
               <a:t>Заменя</a:t>
             </a:r>
             <a:r>
-              <a:rPr lang="en-US" sz="2750" b="1" dirty="0">
+              <a:rPr lang="en-US" sz="2800" b="1" dirty="0">
                 <a:solidFill>
                   <a:schemeClr val="bg2"/>
                 </a:solidFill>
               </a:rPr>
-              <a:t> думата със звезди</a:t>
-            </a:r>
-            <a:endParaRPr lang="en-US" sz="2750" b="1" dirty="0">
+              <a:t> думата със </a:t>
+            </a:r>
+            <a:r>
+              <a:rPr lang="en-US" sz="2800" b="1" dirty="0">
+                <a:solidFill>
+                  <a:schemeClr val="bg1">
+                    <a:lumMod val="60000"/>
+                    <a:lumOff val="40000"/>
+                  </a:schemeClr>
+                </a:solidFill>
+              </a:rPr>
+              <a:t>звезди</a:t>
+            </a:r>
+            <a:endParaRPr lang="en-US" sz="2800" b="1" dirty="0">
               <a:solidFill>
-                <a:schemeClr val="bg2"/>
+                <a:schemeClr val="bg1">
+                  <a:lumMod val="60000"/>
+                  <a:lumOff val="40000"/>
+                </a:schemeClr>
               </a:solidFill>
               <a:cs typeface="Calibri"/>
             </a:endParaRPr>
@@ -22111,7 +22297,7 @@
             <a:pPr algn="ctr"/>
             <a:r>
               <a:rPr lang="bg-BG" sz="1999" dirty="0"/>
-              <a:t>Проверете решението тук</a:t>
+              <a:t>Проверете решението си тук</a:t>
             </a:r>
             <a:r>
               <a:rPr lang="en-US" sz="1999" dirty="0"/>
@@ -22782,19 +22968,39 @@
             <p:ph type="title" sz="quarter" idx="10"/>
           </p:nvPr>
         </p:nvSpPr>
-        <p:spPr/>
+        <p:spPr>
+          <a:xfrm>
+            <a:off x="273054" y="4712640"/>
+            <a:ext cx="11645892" cy="768084"/>
+          </a:xfrm>
+        </p:spPr>
         <p:txBody>
           <a:bodyPr/>
           <a:lstStyle/>
           <a:p>
             <a:r>
-              <a:rPr lang="en-GB" sz="5350" dirty="0">
+              <a:rPr lang="bg-BG" sz="5400" dirty="0">
                 <a:ea typeface="+mj-lt"/>
                 <a:cs typeface="+mj-lt"/>
               </a:rPr>
-              <a:t>Използване на класа StringBuilder </a:t>
-            </a:r>
-            <a:endParaRPr lang="bg-BG" sz="5350" b="0" dirty="0">
+              <a:t>Класът </a:t>
+            </a:r>
+            <a:r>
+              <a:rPr lang="en-GB" sz="5400" dirty="0">
+                <a:latin typeface="Consolas" panose="020B0609020204030204" pitchFamily="49" charset="0"/>
+                <a:ea typeface="+mj-lt"/>
+                <a:cs typeface="Consolas" panose="020B0609020204030204" pitchFamily="49" charset="0"/>
+              </a:rPr>
+              <a:t>StringBuilder</a:t>
+            </a:r>
+            <a:r>
+              <a:rPr lang="en-GB" sz="5400" dirty="0">
+                <a:ea typeface="+mj-lt"/>
+                <a:cs typeface="+mj-lt"/>
+              </a:rPr>
+              <a:t> </a:t>
+            </a:r>
+            <a:endParaRPr lang="bg-BG" sz="5400" b="0" dirty="0">
               <a:ea typeface="+mj-lt"/>
               <a:cs typeface="+mj-lt"/>
             </a:endParaRPr>
@@ -22881,7 +23087,7 @@
         </p:nvSpPr>
         <p:spPr>
           <a:xfrm>
-            <a:off x="1753732" y="1121745"/>
+            <a:off x="1698306" y="1164206"/>
             <a:ext cx="10238431" cy="5274674"/>
           </a:xfrm>
         </p:spPr>
@@ -22891,43 +23097,13 @@
           </a:bodyPr>
           <a:lstStyle/>
           <a:p>
-            <a:pPr marL="360045" indent="-360045"/>
-            <a:endParaRPr lang="en-US" sz="3199" dirty="0">
-              <a:cs typeface="Calibri"/>
-            </a:endParaRPr>
-          </a:p>
-          <a:p>
-            <a:pPr marL="360045" indent="-360045"/>
-            <a:endParaRPr lang="en-US" sz="3199" dirty="0">
-              <a:cs typeface="Calibri"/>
-            </a:endParaRPr>
-          </a:p>
-          <a:p>
-            <a:pPr marL="360045" indent="-360045"/>
-            <a:endParaRPr lang="en-US" sz="3199" dirty="0">
-              <a:cs typeface="Calibri"/>
-            </a:endParaRPr>
-          </a:p>
-          <a:p>
-            <a:pPr marL="360045" indent="-360045"/>
-            <a:endParaRPr lang="en-US" sz="3199" dirty="0">
-              <a:cs typeface="Calibri"/>
-            </a:endParaRPr>
-          </a:p>
-          <a:p>
-            <a:pPr marL="360045" indent="-360045"/>
-            <a:endParaRPr lang="en-US" sz="3199" dirty="0">
-              <a:cs typeface="Calibri"/>
-            </a:endParaRPr>
-          </a:p>
-          <a:p>
             <a:pPr marL="360045" indent="-360045">
               <a:buClr>
                 <a:schemeClr val="tx1"/>
               </a:buClr>
             </a:pPr>
             <a:r>
-              <a:rPr lang="en-US" sz="3250" b="1" noProof="1">
+              <a:rPr lang="en-US" sz="3400" b="1" noProof="1">
                 <a:solidFill>
                   <a:schemeClr val="bg1"/>
                 </a:solidFill>
@@ -22935,30 +23111,58 @@
               <a:t>StringBuilder</a:t>
             </a:r>
             <a:r>
-              <a:rPr lang="en-US" sz="3250" dirty="0"/>
-              <a:t> използва буферно пространство, което е разпределено предварително</a:t>
-            </a:r>
-            <a:endParaRPr lang="en-US" sz="3250" dirty="0">
+              <a:rPr lang="en-US" sz="3400" dirty="0"/>
+              <a:t> </a:t>
+            </a:r>
+            <a:r>
+              <a:rPr lang="bg-BG" sz="3400" dirty="0"/>
+              <a:t>използва </a:t>
+            </a:r>
+            <a:r>
+              <a:rPr lang="bg-BG" sz="3400" b="1" dirty="0">
+                <a:solidFill>
+                  <a:schemeClr val="bg1"/>
+                </a:solidFill>
+              </a:rPr>
+              <a:t>буферно пространство</a:t>
+            </a:r>
+            <a:r>
+              <a:rPr lang="bg-BG" sz="3400" dirty="0"/>
+              <a:t>, което е разпределено предварително</a:t>
+            </a:r>
+            <a:endParaRPr lang="bg-BG" sz="3400" dirty="0">
               <a:cs typeface="Calibri"/>
             </a:endParaRPr>
           </a:p>
           <a:p>
-            <a:pPr lvl="1" indent="-360045"/>
-            <a:r>
-              <a:rPr lang="en-US" sz="3150" dirty="0"/>
-              <a:t>Не заделя памет за повечето операции </a:t>
-            </a:r>
-            <a:r>
-              <a:rPr lang="en-US" sz="3150" dirty="0">
+            <a:pPr lvl="1" indent="-360045">
+              <a:buClr>
+                <a:schemeClr val="tx1"/>
+              </a:buClr>
+            </a:pPr>
+            <a:r>
+              <a:rPr lang="bg-BG" sz="3200" b="1" dirty="0">
+                <a:solidFill>
+                  <a:schemeClr val="bg1"/>
+                </a:solidFill>
+              </a:rPr>
+              <a:t>Не заделя памет </a:t>
+            </a:r>
+            <a:r>
+              <a:rPr lang="bg-BG" sz="3200" dirty="0"/>
+              <a:t>за повечето операции </a:t>
+            </a:r>
+            <a:r>
+              <a:rPr lang="bg-BG" sz="3200" dirty="0">
                 <a:sym typeface="Wingdings" panose="05000000000000000000" pitchFamily="2" charset="2"/>
               </a:rPr>
               <a:t></a:t>
             </a:r>
             <a:r>
-              <a:rPr lang="en-US" sz="3150" dirty="0"/>
+              <a:rPr lang="bg-BG" sz="3200" dirty="0"/>
               <a:t> добра производителност</a:t>
             </a:r>
-            <a:endParaRPr lang="en-US" sz="3150" dirty="0">
+            <a:endParaRPr lang="bg-BG" sz="3200" dirty="0">
               <a:cs typeface="Calibri"/>
             </a:endParaRPr>
           </a:p>
@@ -23014,13 +23218,13 @@
           <p:nvPr>
             <p:extLst>
               <p:ext uri="{D42A27DB-BD31-4B8C-83A1-F6EECF244321}">
-                <p14:modId xmlns:p14="http://schemas.microsoft.com/office/powerpoint/2010/main" val="3349433356"/>
+                <p14:modId xmlns:p14="http://schemas.microsoft.com/office/powerpoint/2010/main" val="2009615771"/>
               </p:ext>
             </p:extLst>
           </p:nvPr>
         </p:nvGraphicFramePr>
         <p:xfrm>
-          <a:off x="5757317" y="2100055"/>
+          <a:off x="5757317" y="4242477"/>
           <a:ext cx="5524648" cy="431688"/>
         </p:xfrm>
         <a:graphic>
@@ -24847,7 +25051,7 @@
         </p:nvSpPr>
         <p:spPr bwMode="auto">
           <a:xfrm rot="16200000">
-            <a:off x="7157158" y="1180011"/>
+            <a:off x="7157158" y="3322433"/>
             <a:ext cx="460255" cy="3244059"/>
           </a:xfrm>
           <a:prstGeom prst="leftBrace">
@@ -24891,7 +25095,7 @@
         </p:nvSpPr>
         <p:spPr bwMode="auto">
           <a:xfrm rot="16200000">
-            <a:off x="9948844" y="1724499"/>
+            <a:off x="9948844" y="3866921"/>
             <a:ext cx="460255" cy="2186951"/>
           </a:xfrm>
           <a:prstGeom prst="leftBrace">
@@ -24935,7 +25139,7 @@
         </p:nvSpPr>
         <p:spPr bwMode="auto">
           <a:xfrm rot="5400000" flipV="1">
-            <a:off x="8349827" y="-873351"/>
+            <a:off x="8349827" y="1269071"/>
             <a:ext cx="331701" cy="5500842"/>
           </a:xfrm>
           <a:prstGeom prst="leftBrace">
@@ -24977,7 +25181,7 @@
         </p:nvSpPr>
         <p:spPr>
           <a:xfrm>
-            <a:off x="2439354" y="1988386"/>
+            <a:off x="2439354" y="4130808"/>
             <a:ext cx="3278537" cy="1564045"/>
           </a:xfrm>
           <a:prstGeom prst="rect">
@@ -25047,7 +25251,7 @@
         </p:nvSpPr>
         <p:spPr>
           <a:xfrm>
-            <a:off x="7790431" y="1143595"/>
+            <a:off x="7790431" y="3286017"/>
             <a:ext cx="1766125" cy="515526"/>
           </a:xfrm>
           <a:prstGeom prst="rect">
@@ -25077,7 +25281,7 @@
         </p:nvSpPr>
         <p:spPr>
           <a:xfrm>
-            <a:off x="6428421" y="3064229"/>
+            <a:off x="6428421" y="5206651"/>
             <a:ext cx="2001022" cy="1372349"/>
           </a:xfrm>
           <a:prstGeom prst="rect">
@@ -25107,7 +25311,7 @@
         </p:nvSpPr>
         <p:spPr>
           <a:xfrm>
-            <a:off x="9417168" y="3068514"/>
+            <a:off x="9417168" y="5210936"/>
             <a:ext cx="2296041" cy="938719"/>
           </a:xfrm>
           <a:prstGeom prst="rect">
@@ -25546,104 +25750,6 @@
                       </p:childTnLst>
                     </p:cTn>
                   </p:par>
-                  <p:par>
-                    <p:cTn id="23" fill="hold">
-                      <p:stCondLst>
-                        <p:cond delay="indefinite"/>
-                      </p:stCondLst>
-                      <p:childTnLst>
-                        <p:par>
-                          <p:cTn id="24" fill="hold">
-                            <p:stCondLst>
-                              <p:cond delay="0"/>
-                            </p:stCondLst>
-                            <p:childTnLst>
-                              <p:par>
-                                <p:cTn id="25" presetID="1" presetClass="entr" presetSubtype="0" fill="hold" nodeType="clickEffect">
-                                  <p:stCondLst>
-                                    <p:cond delay="0"/>
-                                  </p:stCondLst>
-                                  <p:childTnLst>
-                                    <p:set>
-                                      <p:cBhvr>
-                                        <p:cTn id="26" dur="1" fill="hold">
-                                          <p:stCondLst>
-                                            <p:cond delay="0"/>
-                                          </p:stCondLst>
-                                        </p:cTn>
-                                        <p:tgtEl>
-                                          <p:spTgt spid="5">
-                                            <p:txEl>
-                                              <p:pRg st="5" end="5"/>
-                                            </p:txEl>
-                                          </p:spTgt>
-                                        </p:tgtEl>
-                                        <p:attrNameLst>
-                                          <p:attrName>style.visibility</p:attrName>
-                                        </p:attrNameLst>
-                                      </p:cBhvr>
-                                      <p:to>
-                                        <p:strVal val="visible"/>
-                                      </p:to>
-                                    </p:set>
-                                  </p:childTnLst>
-                                </p:cTn>
-                              </p:par>
-                            </p:childTnLst>
-                          </p:cTn>
-                        </p:par>
-                      </p:childTnLst>
-                    </p:cTn>
-                  </p:par>
-                  <p:par>
-                    <p:cTn id="27" fill="hold">
-                      <p:stCondLst>
-                        <p:cond delay="indefinite"/>
-                      </p:stCondLst>
-                      <p:childTnLst>
-                        <p:par>
-                          <p:cTn id="28" fill="hold">
-                            <p:stCondLst>
-                              <p:cond delay="0"/>
-                            </p:stCondLst>
-                            <p:childTnLst>
-                              <p:par>
-                                <p:cTn id="29" presetID="1" presetClass="entr" presetSubtype="0" fill="hold" nodeType="clickEffect">
-                                  <p:stCondLst>
-                                    <p:cond delay="0"/>
-                                  </p:stCondLst>
-                                  <p:childTnLst>
-                                    <p:set>
-                                      <p:cBhvr>
-                                        <p:cTn id="30" dur="1" fill="hold">
-                                          <p:stCondLst>
-                                            <p:cond delay="0"/>
-                                          </p:stCondLst>
-                                        </p:cTn>
-                                        <p:tgtEl>
-                                          <p:spTgt spid="5">
-                                            <p:txEl>
-                                              <p:pRg st="6" end="6"/>
-                                            </p:txEl>
-                                          </p:spTgt>
-                                        </p:tgtEl>
-                                        <p:attrNameLst>
-                                          <p:attrName>style.visibility</p:attrName>
-                                        </p:attrNameLst>
-                                      </p:cBhvr>
-                                      <p:to>
-                                        <p:strVal val="visible"/>
-                                      </p:to>
-                                    </p:set>
-                                  </p:childTnLst>
-                                </p:cTn>
-                              </p:par>
-                            </p:childTnLst>
-                          </p:cTn>
-                        </p:par>
-                      </p:childTnLst>
-                    </p:cTn>
-                  </p:par>
                 </p:childTnLst>
               </p:cTn>
               <p:prevCondLst>
@@ -26059,8 +26165,12 @@
           <a:p>
             <a:pPr marL="360045" indent="-360045"/>
             <a:r>
+              <a:rPr lang="bg-BG" sz="3600" dirty="0"/>
+              <a:t>Използваме</a:t>
+            </a:r>
+            <a:r>
               <a:rPr lang="en-US" sz="3600" dirty="0"/>
-              <a:t>Използвайте </a:t>
+              <a:t> </a:t>
             </a:r>
             <a:r>
               <a:rPr lang="en-US" sz="3600" b="1" noProof="1">
@@ -26073,20 +26183,37 @@
             </a:r>
             <a:r>
               <a:rPr lang="en-US" sz="3600" noProof="1"/>
-              <a:t> з</a:t>
+              <a:t>, </a:t>
+            </a:r>
+            <a:r>
+              <a:rPr lang="bg-BG" sz="3600" noProof="1"/>
+              <a:t>за</a:t>
             </a:r>
             <a:r>
               <a:rPr lang="en-US" sz="3600" dirty="0"/>
-              <a:t>а да</a:t>
-            </a:r>
-            <a:br>
-              <a:rPr lang="en-US" sz="3600" dirty="0">
+              <a:t> да</a:t>
+            </a:r>
+            <a:r>
+              <a:rPr lang="bg-BG" sz="3600" dirty="0">
                 <a:cs typeface="Calibri"/>
               </a:rPr>
-            </a:br>
+              <a:t> </a:t>
+            </a:r>
+            <a:r>
+              <a:rPr lang="bg-BG" sz="3600" dirty="0"/>
+              <a:t>създаваме </a:t>
+            </a:r>
             <a:r>
               <a:rPr lang="en-US" sz="3600" dirty="0"/>
-              <a:t>създавате / модефицирате  низ</a:t>
+              <a:t>/ </a:t>
+            </a:r>
+            <a:r>
+              <a:rPr lang="bg-BG" sz="3600" dirty="0"/>
+              <a:t>модифицираме</a:t>
+            </a:r>
+            <a:r>
+              <a:rPr lang="en-US" sz="3600" dirty="0"/>
+              <a:t> низ</a:t>
             </a:r>
             <a:endParaRPr lang="bg-BG" sz="3600" dirty="0">
               <a:cs typeface="Calibri"/>
@@ -26122,11 +26249,15 @@
               <a:t>Употреба на класа </a:t>
             </a:r>
             <a:r>
-              <a:rPr lang="en-GB" sz="3950" noProof="1"/>
+              <a:rPr lang="en-GB" sz="3950" noProof="1">
+                <a:latin typeface="Consolas" panose="020B0609020204030204" pitchFamily="49" charset="0"/>
+                <a:cs typeface="Consolas" panose="020B0609020204030204" pitchFamily="49" charset="0"/>
+              </a:rPr>
               <a:t>StringBuilder</a:t>
             </a:r>
             <a:endParaRPr lang="en-GB" sz="3950" dirty="0">
-              <a:cs typeface="Calibri"/>
+              <a:latin typeface="Consolas" panose="020B0609020204030204" pitchFamily="49" charset="0"/>
+              <a:cs typeface="Consolas" panose="020B0609020204030204" pitchFamily="49" charset="0"/>
             </a:endParaRPr>
           </a:p>
         </p:txBody>
@@ -26836,18 +26967,21 @@
           <a:lstStyle/>
           <a:p>
             <a:r>
-              <a:rPr lang="en-GB" sz="3950" dirty="0"/>
+              <a:rPr lang="en-GB" sz="4000" dirty="0"/>
               <a:t>Конкатенация и </a:t>
             </a:r>
             <a:r>
-              <a:rPr lang="en-GB" sz="3950" noProof="1"/>
+              <a:rPr lang="en-GB" sz="4000" noProof="1">
+                <a:latin typeface="Consolas" panose="020B0609020204030204" pitchFamily="49" charset="0"/>
+                <a:cs typeface="Consolas" panose="020B0609020204030204" pitchFamily="49" charset="0"/>
+              </a:rPr>
               <a:t>StringBuilder</a:t>
             </a:r>
             <a:r>
-              <a:rPr lang="bg-BG" sz="3950" noProof="1"/>
+              <a:rPr lang="bg-BG" sz="4000" noProof="1"/>
               <a:t> (1)</a:t>
             </a:r>
-            <a:endParaRPr lang="en-GB" sz="3950" noProof="1"/>
+            <a:endParaRPr lang="en-GB" sz="4000" noProof="1"/>
           </a:p>
         </p:txBody>
       </p:sp>
@@ -27774,7 +27908,7 @@
           <a:p>
             <a:pPr marL="360045" indent="-360045"/>
             <a:r>
-              <a:rPr lang="en-US" sz="3350" dirty="0">
+              <a:rPr lang="en-US" sz="3400" dirty="0">
                 <a:solidFill>
                   <a:srgbClr val="234465"/>
                 </a:solidFill>
@@ -27784,7 +27918,7 @@
               <a:t>Използване на </a:t>
             </a:r>
             <a:r>
-              <a:rPr lang="en-US" sz="3350" b="1" noProof="1">
+              <a:rPr lang="en-US" sz="3400" b="1" noProof="1">
                 <a:solidFill>
                   <a:schemeClr val="bg1"/>
                 </a:solidFill>
@@ -27793,11 +27927,16 @@
               </a:rPr>
               <a:t>StringBuilder</a:t>
             </a:r>
-            <a:endParaRPr lang="bg-BG" b="1" noProof="1">
-              <a:solidFill>
-                <a:schemeClr val="bg1"/>
-              </a:solidFill>
-              <a:latin typeface="Consolas" panose="020B0609020204030204" pitchFamily="49" charset="0"/>
+            <a:r>
+              <a:rPr lang="en-US" sz="3400" noProof="1">
+                <a:latin typeface="Calibri" panose="020F0502020204030204" pitchFamily="34" charset="0"/>
+                <a:cs typeface="Calibri" panose="020F0502020204030204" pitchFamily="34" charset="0"/>
+              </a:rPr>
+              <a:t>:</a:t>
+            </a:r>
+            <a:endParaRPr lang="bg-BG" sz="3400" noProof="1">
+              <a:latin typeface="Calibri" panose="020F0502020204030204" pitchFamily="34" charset="0"/>
+              <a:cs typeface="Calibri" panose="020F0502020204030204" pitchFamily="34" charset="0"/>
             </a:endParaRPr>
           </a:p>
           <a:p>
@@ -27831,18 +27970,21 @@
           <a:lstStyle/>
           <a:p>
             <a:r>
-              <a:rPr lang="en-GB" sz="3950" dirty="0"/>
+              <a:rPr lang="en-GB" sz="4000" dirty="0"/>
               <a:t>Конкатенация и </a:t>
             </a:r>
             <a:r>
-              <a:rPr lang="en-GB" sz="3950" noProof="1"/>
+              <a:rPr lang="en-GB" sz="4000" noProof="1">
+                <a:latin typeface="Consolas" panose="020B0609020204030204" pitchFamily="49" charset="0"/>
+                <a:cs typeface="Consolas" panose="020B0609020204030204" pitchFamily="49" charset="0"/>
+              </a:rPr>
               <a:t>StringBuilder</a:t>
             </a:r>
             <a:r>
-              <a:rPr lang="bg-BG" sz="3950" noProof="1"/>
+              <a:rPr lang="bg-BG" sz="4000" noProof="1"/>
               <a:t> (2)</a:t>
             </a:r>
-            <a:endParaRPr lang="en-GB" sz="3950" noProof="1"/>
+            <a:endParaRPr lang="en-GB" sz="4000" noProof="1"/>
           </a:p>
         </p:txBody>
       </p:sp>
@@ -28374,84 +28516,6 @@
                                         </p:cTn>
                                         <p:tgtEl>
                                           <p:spTgt spid="11">
-                                            <p:bg/>
-                                          </p:spTgt>
-                                        </p:tgtEl>
-                                        <p:attrNameLst>
-                                          <p:attrName>style.visibility</p:attrName>
-                                        </p:attrNameLst>
-                                      </p:cBhvr>
-                                      <p:to>
-                                        <p:strVal val="visible"/>
-                                      </p:to>
-                                    </p:set>
-                                  </p:childTnLst>
-                                </p:cTn>
-                              </p:par>
-                              <p:par>
-                                <p:cTn id="7" presetID="1" presetClass="entr" presetSubtype="0" fill="hold" grpId="0" nodeType="withEffect">
-                                  <p:stCondLst>
-                                    <p:cond delay="0"/>
-                                  </p:stCondLst>
-                                  <p:childTnLst>
-                                    <p:set>
-                                      <p:cBhvr>
-                                        <p:cTn id="8" dur="1" fill="hold">
-                                          <p:stCondLst>
-                                            <p:cond delay="0"/>
-                                          </p:stCondLst>
-                                        </p:cTn>
-                                        <p:tgtEl>
-                                          <p:spTgt spid="11">
-                                            <p:txEl>
-                                              <p:pRg st="0" end="0"/>
-                                            </p:txEl>
-                                          </p:spTgt>
-                                        </p:tgtEl>
-                                        <p:attrNameLst>
-                                          <p:attrName>style.visibility</p:attrName>
-                                        </p:attrNameLst>
-                                      </p:cBhvr>
-                                      <p:to>
-                                        <p:strVal val="visible"/>
-                                      </p:to>
-                                    </p:set>
-                                  </p:childTnLst>
-                                </p:cTn>
-                              </p:par>
-                            </p:childTnLst>
-                          </p:cTn>
-                        </p:par>
-                      </p:childTnLst>
-                    </p:cTn>
-                  </p:par>
-                  <p:par>
-                    <p:cTn id="9" fill="hold">
-                      <p:stCondLst>
-                        <p:cond delay="indefinite"/>
-                      </p:stCondLst>
-                      <p:childTnLst>
-                        <p:par>
-                          <p:cTn id="10" fill="hold">
-                            <p:stCondLst>
-                              <p:cond delay="0"/>
-                            </p:stCondLst>
-                            <p:childTnLst>
-                              <p:par>
-                                <p:cTn id="11" presetID="1" presetClass="entr" presetSubtype="0" fill="hold" grpId="0" nodeType="clickEffect">
-                                  <p:stCondLst>
-                                    <p:cond delay="0"/>
-                                  </p:stCondLst>
-                                  <p:childTnLst>
-                                    <p:set>
-                                      <p:cBhvr>
-                                        <p:cTn id="12" dur="1" fill="hold">
-                                          <p:stCondLst>
-                                            <p:cond delay="0"/>
-                                          </p:stCondLst>
-                                        </p:cTn>
-                                        <p:tgtEl>
-                                          <p:spTgt spid="11">
                                             <p:txEl>
                                               <p:pRg st="1" end="1"/>
                                             </p:txEl>
@@ -28475,26 +28539,26 @@
                     </p:cTn>
                   </p:par>
                   <p:par>
-                    <p:cTn id="13" fill="hold">
+                    <p:cTn id="7" fill="hold">
                       <p:stCondLst>
                         <p:cond delay="indefinite"/>
                       </p:stCondLst>
                       <p:childTnLst>
                         <p:par>
-                          <p:cTn id="14" fill="hold">
+                          <p:cTn id="8" fill="hold">
                             <p:stCondLst>
                               <p:cond delay="0"/>
                             </p:stCondLst>
                             <p:childTnLst>
                               <p:par>
-                                <p:cTn id="15" presetID="1" presetClass="entr" presetSubtype="0" fill="hold" grpId="0" nodeType="clickEffect">
+                                <p:cTn id="9" presetID="1" presetClass="entr" presetSubtype="0" fill="hold" grpId="0" nodeType="clickEffect">
                                   <p:stCondLst>
                                     <p:cond delay="0"/>
                                   </p:stCondLst>
                                   <p:childTnLst>
                                     <p:set>
                                       <p:cBhvr>
-                                        <p:cTn id="16" dur="1" fill="hold">
+                                        <p:cTn id="10" dur="1" fill="hold">
                                           <p:stCondLst>
                                             <p:cond delay="0"/>
                                           </p:stCondLst>
@@ -28524,26 +28588,26 @@
                     </p:cTn>
                   </p:par>
                   <p:par>
-                    <p:cTn id="17" fill="hold">
+                    <p:cTn id="11" fill="hold">
                       <p:stCondLst>
                         <p:cond delay="indefinite"/>
                       </p:stCondLst>
                       <p:childTnLst>
                         <p:par>
-                          <p:cTn id="18" fill="hold">
+                          <p:cTn id="12" fill="hold">
                             <p:stCondLst>
                               <p:cond delay="0"/>
                             </p:stCondLst>
                             <p:childTnLst>
                               <p:par>
-                                <p:cTn id="19" presetID="1" presetClass="entr" presetSubtype="0" fill="hold" grpId="0" nodeType="clickEffect">
+                                <p:cTn id="13" presetID="1" presetClass="entr" presetSubtype="0" fill="hold" grpId="0" nodeType="clickEffect">
                                   <p:stCondLst>
                                     <p:cond delay="0"/>
                                   </p:stCondLst>
                                   <p:childTnLst>
                                     <p:set>
                                       <p:cBhvr>
-                                        <p:cTn id="20" dur="1" fill="hold">
+                                        <p:cTn id="14" dur="1" fill="hold">
                                           <p:stCondLst>
                                             <p:cond delay="0"/>
                                           </p:stCondLst>
@@ -28573,26 +28637,26 @@
                     </p:cTn>
                   </p:par>
                   <p:par>
-                    <p:cTn id="21" fill="hold">
+                    <p:cTn id="15" fill="hold">
                       <p:stCondLst>
                         <p:cond delay="indefinite"/>
                       </p:stCondLst>
                       <p:childTnLst>
                         <p:par>
-                          <p:cTn id="22" fill="hold">
+                          <p:cTn id="16" fill="hold">
                             <p:stCondLst>
                               <p:cond delay="0"/>
                             </p:stCondLst>
                             <p:childTnLst>
                               <p:par>
-                                <p:cTn id="23" presetID="1" presetClass="entr" presetSubtype="0" fill="hold" grpId="0" nodeType="clickEffect">
+                                <p:cTn id="17" presetID="1" presetClass="entr" presetSubtype="0" fill="hold" grpId="0" nodeType="clickEffect">
                                   <p:stCondLst>
                                     <p:cond delay="0"/>
                                   </p:stCondLst>
                                   <p:childTnLst>
                                     <p:set>
                                       <p:cBhvr>
-                                        <p:cTn id="24" dur="1" fill="hold">
+                                        <p:cTn id="18" dur="1" fill="hold">
                                           <p:stCondLst>
                                             <p:cond delay="0"/>
                                           </p:stCondLst>
@@ -28622,26 +28686,26 @@
                     </p:cTn>
                   </p:par>
                   <p:par>
-                    <p:cTn id="25" fill="hold">
+                    <p:cTn id="19" fill="hold">
                       <p:stCondLst>
                         <p:cond delay="indefinite"/>
                       </p:stCondLst>
                       <p:childTnLst>
                         <p:par>
-                          <p:cTn id="26" fill="hold">
+                          <p:cTn id="20" fill="hold">
                             <p:stCondLst>
                               <p:cond delay="0"/>
                             </p:stCondLst>
                             <p:childTnLst>
                               <p:par>
-                                <p:cTn id="27" presetID="1" presetClass="entr" presetSubtype="0" fill="hold" grpId="0" nodeType="clickEffect">
+                                <p:cTn id="21" presetID="1" presetClass="entr" presetSubtype="0" fill="hold" grpId="0" nodeType="clickEffect">
                                   <p:stCondLst>
                                     <p:cond delay="0"/>
                                   </p:stCondLst>
                                   <p:childTnLst>
                                     <p:set>
                                       <p:cBhvr>
-                                        <p:cTn id="28" dur="1" fill="hold">
+                                        <p:cTn id="22" dur="1" fill="hold">
                                           <p:stCondLst>
                                             <p:cond delay="0"/>
                                           </p:stCondLst>
@@ -28671,26 +28735,26 @@
                     </p:cTn>
                   </p:par>
                   <p:par>
-                    <p:cTn id="29" fill="hold">
+                    <p:cTn id="23" fill="hold">
                       <p:stCondLst>
                         <p:cond delay="indefinite"/>
                       </p:stCondLst>
                       <p:childTnLst>
                         <p:par>
-                          <p:cTn id="30" fill="hold">
+                          <p:cTn id="24" fill="hold">
                             <p:stCondLst>
                               <p:cond delay="0"/>
                             </p:stCondLst>
                             <p:childTnLst>
                               <p:par>
-                                <p:cTn id="31" presetID="1" presetClass="entr" presetSubtype="0" fill="hold" grpId="0" nodeType="clickEffect">
+                                <p:cTn id="25" presetID="1" presetClass="entr" presetSubtype="0" fill="hold" grpId="0" nodeType="clickEffect">
                                   <p:stCondLst>
                                     <p:cond delay="0"/>
                                   </p:stCondLst>
                                   <p:childTnLst>
                                     <p:set>
                                       <p:cBhvr>
-                                        <p:cTn id="32" dur="1" fill="hold">
+                                        <p:cTn id="26" dur="1" fill="hold">
                                           <p:stCondLst>
                                             <p:cond delay="0"/>
                                           </p:stCondLst>
@@ -28741,7 +28805,7 @@
       </p:par>
     </p:tnLst>
     <p:bldLst>
-      <p:bldP spid="11" grpId="0" uiExpand="1" build="p" animBg="1"/>
+      <p:bldP spid="11" grpId="0" uiExpand="1" build="p"/>
     </p:bldLst>
   </p:timing>
 </p:sld>
@@ -28795,7 +28859,7 @@
               </a:buClr>
             </a:pPr>
             <a:r>
-              <a:rPr lang="en-GB" sz="3350" b="1" dirty="0">
+              <a:rPr lang="en-GB" sz="3400" b="1" dirty="0">
                 <a:solidFill>
                   <a:schemeClr val="bg1"/>
                 </a:solidFill>
@@ -28804,13 +28868,13 @@
               <a:t>Append</a:t>
             </a:r>
             <a:r>
-              <a:rPr lang="en-GB" sz="3350" dirty="0">
+              <a:rPr lang="en-GB" sz="3400" dirty="0">
                 <a:latin typeface="Consolas"/>
               </a:rPr>
               <a:t>(</a:t>
             </a:r>
             <a:r>
-              <a:rPr lang="en-GB" sz="3350" b="1" dirty="0">
+              <a:rPr lang="en-GB" sz="3400" b="1" dirty="0">
                 <a:solidFill>
                   <a:schemeClr val="bg1"/>
                 </a:solidFill>
@@ -28819,20 +28883,20 @@
               <a:t>…</a:t>
             </a:r>
             <a:r>
-              <a:rPr lang="en-GB" sz="3350" dirty="0">
+              <a:rPr lang="en-GB" sz="3400" dirty="0">
                 <a:latin typeface="Consolas"/>
               </a:rPr>
               <a:t>)</a:t>
             </a:r>
             <a:r>
-              <a:rPr lang="en-GB" sz="3350" dirty="0"/>
+              <a:rPr lang="en-GB" sz="3400" dirty="0"/>
               <a:t> – добавя текст в края на низ</a:t>
             </a:r>
             <a:r>
-              <a:rPr lang="en-US" sz="3350" dirty="0"/>
+              <a:rPr lang="en-US" sz="3400" dirty="0"/>
               <a:t>a</a:t>
             </a:r>
-            <a:endParaRPr lang="bg-BG" sz="3350" dirty="0"/>
+            <a:endParaRPr lang="bg-BG" sz="3400" dirty="0"/>
           </a:p>
           <a:p>
             <a:pPr marL="0" indent="0">
@@ -28875,7 +28939,7 @@
               </a:buClr>
             </a:pPr>
             <a:r>
-              <a:rPr lang="en-GB" sz="3350" b="1" dirty="0">
+              <a:rPr lang="en-GB" sz="3400" b="1" dirty="0">
                 <a:solidFill>
                   <a:schemeClr val="bg1"/>
                 </a:solidFill>
@@ -28884,10 +28948,10 @@
               <a:t>Length</a:t>
             </a:r>
             <a:r>
-              <a:rPr lang="en-GB" sz="3350" dirty="0"/>
+              <a:rPr lang="en-GB" sz="3400" dirty="0"/>
               <a:t> – пази дължината на низа в буфера</a:t>
             </a:r>
-            <a:endParaRPr lang="en-US" sz="3350" dirty="0">
+            <a:endParaRPr lang="en-US" sz="3400" dirty="0">
               <a:cs typeface="Calibri"/>
             </a:endParaRPr>
           </a:p>
@@ -28934,7 +28998,7 @@
               </a:buClr>
             </a:pPr>
             <a:r>
-              <a:rPr lang="en-GB" sz="3350" b="1" dirty="0">
+              <a:rPr lang="en-GB" sz="3400" b="1" dirty="0">
                 <a:solidFill>
                   <a:schemeClr val="bg1"/>
                 </a:solidFill>
@@ -28943,13 +29007,13 @@
               <a:t>Clear</a:t>
             </a:r>
             <a:r>
-              <a:rPr lang="en-GB" sz="3350" dirty="0">
+              <a:rPr lang="en-GB" sz="3400" dirty="0">
                 <a:latin typeface="Consolas"/>
               </a:rPr>
               <a:t>(</a:t>
             </a:r>
             <a:r>
-              <a:rPr lang="en-GB" sz="3350" b="1" dirty="0">
+              <a:rPr lang="en-GB" sz="3400" b="1" dirty="0">
                 <a:solidFill>
                   <a:schemeClr val="bg1"/>
                 </a:solidFill>
@@ -28958,20 +29022,20 @@
               <a:t>…</a:t>
             </a:r>
             <a:r>
-              <a:rPr lang="en-GB" sz="3350" dirty="0">
+              <a:rPr lang="en-GB" sz="3400" dirty="0">
                 <a:latin typeface="Consolas"/>
               </a:rPr>
               <a:t>)</a:t>
             </a:r>
             <a:r>
-              <a:rPr lang="en-GB" sz="3350" b="1" dirty="0"/>
+              <a:rPr lang="en-GB" sz="3400" b="1" dirty="0"/>
               <a:t> </a:t>
             </a:r>
             <a:r>
-              <a:rPr lang="en-GB" sz="3350" dirty="0"/>
+              <a:rPr lang="en-GB" sz="3400" dirty="0"/>
               <a:t>– премахва всички символи</a:t>
             </a:r>
-            <a:endParaRPr lang="en-GB" b="1" dirty="0">
+            <a:endParaRPr lang="en-GB" sz="3400" b="1" dirty="0">
               <a:solidFill>
                 <a:schemeClr val="bg1"/>
               </a:solidFill>
@@ -28992,18 +29056,31 @@
         </p:nvSpPr>
         <p:spPr/>
         <p:txBody>
-          <a:bodyPr/>
+          <a:bodyPr>
+            <a:normAutofit/>
+          </a:bodyPr>
           <a:lstStyle/>
           <a:p>
             <a:r>
-              <a:rPr lang="en-GB" sz="3950" noProof="1"/>
-              <a:t>Методи за StringBuilder </a:t>
-            </a:r>
-            <a:r>
-              <a:rPr lang="en-GB" sz="3950" dirty="0"/>
+              <a:rPr lang="en-GB" sz="4000" noProof="1"/>
+              <a:t>Методи за </a:t>
+            </a:r>
+            <a:r>
+              <a:rPr lang="en-GB" sz="4000" noProof="1">
+                <a:latin typeface="Consolas" panose="020B0609020204030204" pitchFamily="49" charset="0"/>
+                <a:cs typeface="Consolas" panose="020B0609020204030204" pitchFamily="49" charset="0"/>
+              </a:rPr>
+              <a:t>StringBuilder</a:t>
+            </a:r>
+            <a:r>
+              <a:rPr lang="en-GB" sz="4000" noProof="1"/>
+              <a:t> </a:t>
+            </a:r>
+            <a:r>
+              <a:rPr lang="en-GB" sz="4000" dirty="0"/>
               <a:t>(1)</a:t>
             </a:r>
-            <a:endParaRPr lang="bg-BG" sz="3950" dirty="0"/>
+            <a:endParaRPr lang="bg-BG" sz="4000" dirty="0"/>
           </a:p>
         </p:txBody>
       </p:sp>
@@ -29642,7 +29719,7 @@
                             </p:stCondLst>
                             <p:childTnLst>
                               <p:par>
-                                <p:cTn id="5" presetID="1" presetClass="entr" presetSubtype="0" fill="hold" grpId="0" nodeType="clickEffect">
+                                <p:cTn id="5" presetID="1" presetClass="entr" presetSubtype="0" fill="hold" nodeType="clickEffect">
                                   <p:stCondLst>
                                     <p:cond delay="0"/>
                                   </p:stCondLst>
@@ -29655,7 +29732,11 @@
                                           </p:stCondLst>
                                         </p:cTn>
                                         <p:tgtEl>
-                                          <p:spTgt spid="13"/>
+                                          <p:spTgt spid="7">
+                                            <p:txEl>
+                                              <p:pRg st="3" end="3"/>
+                                            </p:txEl>
+                                          </p:spTgt>
                                         </p:tgtEl>
                                         <p:attrNameLst>
                                           <p:attrName>style.visibility</p:attrName>
@@ -29772,7 +29853,6 @@
       </p:par>
     </p:tnLst>
     <p:bldLst>
-      <p:bldP spid="13" grpId="0" animBg="1"/>
       <p:bldP spid="14" grpId="0" animBg="1"/>
     </p:bldLst>
   </p:timing>
@@ -29822,7 +29902,7 @@
               </a:buClr>
             </a:pPr>
             <a:r>
-              <a:rPr lang="bg-BG" sz="3350" b="1" dirty="0">
+              <a:rPr lang="bg-BG" sz="3400" b="1" dirty="0">
                 <a:solidFill>
                   <a:schemeClr val="bg1"/>
                 </a:solidFill>
@@ -29831,7 +29911,7 @@
               <a:t>[</a:t>
             </a:r>
             <a:r>
-              <a:rPr lang="en-GB" sz="3350" b="1" noProof="1">
+              <a:rPr lang="en-GB" sz="3400" b="1" noProof="1">
                 <a:solidFill>
                   <a:schemeClr val="bg1"/>
                 </a:solidFill>
@@ -29840,7 +29920,7 @@
               <a:t>int</a:t>
             </a:r>
             <a:r>
-              <a:rPr lang="en-GB" sz="3350" b="1" dirty="0">
+              <a:rPr lang="en-GB" sz="3400" b="1" dirty="0">
                 <a:solidFill>
                   <a:schemeClr val="bg1"/>
                 </a:solidFill>
@@ -29849,14 +29929,14 @@
               <a:t> индекс]</a:t>
             </a:r>
             <a:r>
-              <a:rPr lang="en-GB" sz="3350" dirty="0"/>
+              <a:rPr lang="en-GB" sz="3400" dirty="0"/>
               <a:t> – </a:t>
             </a:r>
             <a:r>
-              <a:rPr lang="en-US" sz="3350" dirty="0"/>
+              <a:rPr lang="en-US" sz="3400" dirty="0"/>
               <a:t>връща символ на даден индекс</a:t>
             </a:r>
-            <a:endParaRPr lang="en-GB" sz="3350" b="1" dirty="0">
+            <a:endParaRPr lang="en-GB" sz="3400" b="1" dirty="0">
               <a:solidFill>
                 <a:schemeClr val="bg1"/>
               </a:solidFill>
@@ -29921,7 +30001,7 @@
               </a:buClr>
             </a:pPr>
             <a:r>
-              <a:rPr lang="en-GB" sz="3350" b="1" noProof="1">
+              <a:rPr lang="en-GB" sz="3400" b="1" noProof="1">
                 <a:solidFill>
                   <a:schemeClr val="bg1"/>
                 </a:solidFill>
@@ -29930,13 +30010,13 @@
               <a:t>Insert</a:t>
             </a:r>
             <a:r>
-              <a:rPr lang="en-GB" sz="3350" noProof="1">
+              <a:rPr lang="en-GB" sz="3400" noProof="1">
                 <a:latin typeface="Consolas"/>
               </a:rPr>
               <a:t>(</a:t>
             </a:r>
             <a:r>
-              <a:rPr lang="en-GB" sz="3350" b="1" noProof="1">
+              <a:rPr lang="en-GB" sz="3400" b="1" noProof="1">
                 <a:solidFill>
                   <a:schemeClr val="bg1"/>
                 </a:solidFill>
@@ -29945,7 +30025,7 @@
               <a:t>int</a:t>
             </a:r>
             <a:r>
-              <a:rPr lang="en-GB" sz="3350" b="1" dirty="0">
+              <a:rPr lang="en-GB" sz="3400" b="1" dirty="0">
                 <a:solidFill>
                   <a:schemeClr val="bg1"/>
                 </a:solidFill>
@@ -29954,13 +30034,13 @@
               <a:t> индекс, string низ</a:t>
             </a:r>
             <a:r>
-              <a:rPr lang="en-GB" sz="3350" dirty="0">
+              <a:rPr lang="en-GB" sz="3400" dirty="0">
                 <a:latin typeface="Consolas"/>
               </a:rPr>
               <a:t>)</a:t>
             </a:r>
             <a:r>
-              <a:rPr lang="en-GB" sz="3350" b="1" dirty="0">
+              <a:rPr lang="en-GB" sz="3400" b="1" dirty="0">
                 <a:solidFill>
                   <a:schemeClr val="bg1"/>
                 </a:solidFill>
@@ -29968,10 +30048,10 @@
               <a:t> </a:t>
             </a:r>
             <a:r>
-              <a:rPr lang="en-GB" sz="3350" dirty="0"/>
+              <a:rPr lang="en-GB" sz="3400" dirty="0"/>
               <a:t>–  вмъква низ на определен индекс</a:t>
             </a:r>
-            <a:endParaRPr lang="en-US" sz="3350" dirty="0">
+            <a:endParaRPr lang="en-US" sz="3400" dirty="0">
               <a:cs typeface="Calibri"/>
             </a:endParaRPr>
           </a:p>
@@ -30002,18 +30082,31 @@
         </p:nvSpPr>
         <p:spPr/>
         <p:txBody>
-          <a:bodyPr/>
+          <a:bodyPr>
+            <a:normAutofit/>
+          </a:bodyPr>
           <a:lstStyle/>
           <a:p>
             <a:r>
-              <a:rPr lang="en-GB" sz="3950" noProof="1"/>
-              <a:t>Методи за StringBuilder </a:t>
-            </a:r>
-            <a:r>
-              <a:rPr lang="en-GB" sz="3950" dirty="0"/>
+              <a:rPr lang="en-GB" sz="4000" noProof="1"/>
+              <a:t>Методи за </a:t>
+            </a:r>
+            <a:r>
+              <a:rPr lang="en-GB" sz="4000" noProof="1">
+                <a:latin typeface="Consolas" panose="020B0609020204030204" pitchFamily="49" charset="0"/>
+                <a:cs typeface="Consolas" panose="020B0609020204030204" pitchFamily="49" charset="0"/>
+              </a:rPr>
+              <a:t>StringBuilder</a:t>
+            </a:r>
+            <a:r>
+              <a:rPr lang="en-GB" sz="4000" noProof="1"/>
+              <a:t> </a:t>
+            </a:r>
+            <a:r>
+              <a:rPr lang="en-GB" sz="4000" dirty="0"/>
               <a:t>(2)</a:t>
             </a:r>
-            <a:endParaRPr lang="bg-BG" dirty="0">
+            <a:endParaRPr lang="bg-BG" sz="4000" dirty="0">
               <a:cs typeface="Calibri"/>
             </a:endParaRPr>
           </a:p>
@@ -32147,7 +32240,15 @@
             </a:r>
             <a:r>
               <a:rPr lang="en-GB" sz="3400" dirty="0"/>
-              <a:t>– връща </a:t>
+              <a:t>– </a:t>
+            </a:r>
+            <a:r>
+              <a:rPr lang="bg-BG" sz="3400" dirty="0"/>
+              <a:t>конвертира в</a:t>
+            </a:r>
+            <a:r>
+              <a:rPr lang="en-GB" sz="3400" dirty="0"/>
+              <a:t> </a:t>
             </a:r>
             <a:r>
               <a:rPr lang="en-GB" sz="3400" b="1" dirty="0">
@@ -32188,7 +32289,18 @@
           <a:p>
             <a:r>
               <a:rPr lang="en-GB" sz="3950" noProof="1"/>
-              <a:t>Методи за StringBuilder </a:t>
+              <a:t>Методи за </a:t>
+            </a:r>
+            <a:r>
+              <a:rPr lang="en-GB" sz="3950" noProof="1">
+                <a:latin typeface="Consolas" panose="020B0609020204030204" pitchFamily="49" charset="0"/>
+                <a:cs typeface="Consolas" panose="020B0609020204030204" pitchFamily="49" charset="0"/>
+              </a:rPr>
+              <a:t>StringBuilder</a:t>
+            </a:r>
+            <a:r>
+              <a:rPr lang="en-GB" sz="3950" noProof="1"/>
+              <a:t> </a:t>
             </a:r>
             <a:r>
               <a:rPr lang="en-GB" sz="3950" dirty="0"/>
@@ -32822,7 +32934,7 @@
                             </p:stCondLst>
                             <p:childTnLst>
                               <p:par>
-                                <p:cTn id="5" presetID="1" presetClass="entr" presetSubtype="0" fill="hold" grpId="0" nodeType="clickEffect">
+                                <p:cTn id="5" presetID="1" presetClass="entr" presetSubtype="0" fill="hold" nodeType="clickEffect">
                                   <p:stCondLst>
                                     <p:cond delay="0"/>
                                   </p:stCondLst>
@@ -32835,7 +32947,11 @@
                                           </p:stCondLst>
                                         </p:cTn>
                                         <p:tgtEl>
-                                          <p:spTgt spid="12"/>
+                                          <p:spTgt spid="5">
+                                            <p:txEl>
+                                              <p:pRg st="3" end="3"/>
+                                            </p:txEl>
+                                          </p:spTgt>
                                         </p:tgtEl>
                                         <p:attrNameLst>
                                           <p:attrName>style.visibility</p:attrName>
@@ -32867,7 +32983,7 @@
                             </p:stCondLst>
                             <p:childTnLst>
                               <p:par>
-                                <p:cTn id="9" presetID="1" presetClass="entr" presetSubtype="0" fill="hold" nodeType="clickEffect">
+                                <p:cTn id="9" presetID="1" presetClass="entr" presetSubtype="0" fill="hold" grpId="0" nodeType="clickEffect">
                                   <p:stCondLst>
                                     <p:cond delay="0"/>
                                   </p:stCondLst>
@@ -32875,55 +32991,6 @@
                                     <p:set>
                                       <p:cBhvr>
                                         <p:cTn id="10" dur="1" fill="hold">
-                                          <p:stCondLst>
-                                            <p:cond delay="0"/>
-                                          </p:stCondLst>
-                                        </p:cTn>
-                                        <p:tgtEl>
-                                          <p:spTgt spid="5">
-                                            <p:txEl>
-                                              <p:pRg st="3" end="3"/>
-                                            </p:txEl>
-                                          </p:spTgt>
-                                        </p:tgtEl>
-                                        <p:attrNameLst>
-                                          <p:attrName>style.visibility</p:attrName>
-                                        </p:attrNameLst>
-                                      </p:cBhvr>
-                                      <p:to>
-                                        <p:strVal val="visible"/>
-                                      </p:to>
-                                    </p:set>
-                                  </p:childTnLst>
-                                </p:cTn>
-                              </p:par>
-                            </p:childTnLst>
-                          </p:cTn>
-                        </p:par>
-                      </p:childTnLst>
-                    </p:cTn>
-                  </p:par>
-                  <p:par>
-                    <p:cTn id="11" fill="hold">
-                      <p:stCondLst>
-                        <p:cond delay="indefinite"/>
-                      </p:stCondLst>
-                      <p:childTnLst>
-                        <p:par>
-                          <p:cTn id="12" fill="hold">
-                            <p:stCondLst>
-                              <p:cond delay="0"/>
-                            </p:stCondLst>
-                            <p:childTnLst>
-                              <p:par>
-                                <p:cTn id="13" presetID="1" presetClass="entr" presetSubtype="0" fill="hold" grpId="0" nodeType="clickEffect">
-                                  <p:stCondLst>
-                                    <p:cond delay="0"/>
-                                  </p:stCondLst>
-                                  <p:childTnLst>
-                                    <p:set>
-                                      <p:cBhvr>
-                                        <p:cTn id="14" dur="1" fill="hold">
                                           <p:stCondLst>
                                             <p:cond delay="0"/>
                                           </p:stCondLst>
@@ -32971,7 +33038,6 @@
     </p:tnLst>
     <p:bldLst>
       <p:bldP spid="8" grpId="0" animBg="1"/>
-      <p:bldP spid="12" grpId="0" animBg="1"/>
     </p:bldLst>
   </p:timing>
 </p:sld>
@@ -33334,8 +33400,8 @@
         </p:nvSpPr>
         <p:spPr>
           <a:xfrm>
-            <a:off x="713101" y="1638431"/>
-            <a:ext cx="10737899" cy="4748837"/>
+            <a:off x="713101" y="1638432"/>
+            <a:ext cx="11039929" cy="4569172"/>
           </a:xfrm>
           <a:prstGeom prst="rect">
             <a:avLst/>
@@ -33514,29 +33580,57 @@
           </a:lstStyle>
           <a:p>
             <a:pPr marL="456565" indent="-456565" latinLnBrk="0">
+              <a:lnSpc>
+                <a:spcPct val="110000"/>
+              </a:lnSpc>
               <a:spcBef>
                 <a:spcPts val="1200"/>
               </a:spcBef>
+              <a:buClr>
+                <a:schemeClr val="tx1"/>
+              </a:buClr>
             </a:pPr>
             <a:r>
-              <a:rPr lang="en-US" sz="3600" dirty="0">
+              <a:rPr lang="en-US" sz="3800" b="1" dirty="0">
+                <a:solidFill>
+                  <a:schemeClr val="accent1">
+                    <a:lumMod val="60000"/>
+                    <a:lumOff val="40000"/>
+                  </a:schemeClr>
+                </a:solidFill>
+              </a:rPr>
+              <a:t>Низ</a:t>
+            </a:r>
+            <a:r>
+              <a:rPr lang="bg-BG" sz="3800" b="1" dirty="0">
+                <a:solidFill>
+                  <a:schemeClr val="accent1">
+                    <a:lumMod val="60000"/>
+                    <a:lumOff val="40000"/>
+                  </a:schemeClr>
+                </a:solidFill>
+              </a:rPr>
+              <a:t> == </a:t>
+            </a:r>
+            <a:r>
+              <a:rPr lang="en-US" sz="3800" dirty="0">
                 <a:solidFill>
                   <a:schemeClr val="bg2"/>
                 </a:solidFill>
               </a:rPr>
-              <a:t>Низовете са неизменими поредици от </a:t>
-            </a:r>
-            <a:r>
-              <a:rPr lang="en-US" sz="3600" dirty="0">
+              <a:t>неизменими поредици от </a:t>
+            </a:r>
+            <a:r>
+              <a:rPr lang="bg-BG" sz="3800" dirty="0">
                 <a:solidFill>
                   <a:schemeClr val="bg2"/>
                 </a:solidFill>
                 <a:ea typeface="+mn-lt"/>
                 <a:cs typeface="+mn-lt"/>
               </a:rPr>
-              <a:t>unicode знаци</a:t>
-            </a:r>
-            <a:endParaRPr lang="en-US" sz="3600" dirty="0">
+              <a:t>символи</a:t>
+            </a:r>
+            <a:endParaRPr lang="en-US" sz="3800" dirty="0">
               <a:solidFill>
                 <a:schemeClr val="bg2"/>
               </a:solidFill>
@@ -33545,19 +33639,46 @@
           </a:p>
           <a:p>
             <a:pPr marL="456565" indent="-456565" latinLnBrk="0">
+              <a:lnSpc>
+                <a:spcPct val="110000"/>
+              </a:lnSpc>
               <a:spcBef>
                 <a:spcPts val="1200"/>
               </a:spcBef>
             </a:pPr>
             <a:r>
-              <a:rPr lang="en-US" sz="3600" dirty="0">
+              <a:rPr lang="en-US" sz="3800" dirty="0">
                 <a:solidFill>
                   <a:schemeClr val="bg2"/>
                 </a:solidFill>
               </a:rPr>
-              <a:t>Методи за операции на низ</a:t>
-            </a:r>
-            <a:endParaRPr lang="en-US" sz="3600" dirty="0">
+              <a:t>Методи за </a:t>
+            </a:r>
+            <a:r>
+              <a:rPr lang="bg-BG" sz="3800" dirty="0">
+                <a:solidFill>
+                  <a:schemeClr val="bg2"/>
+                </a:solidFill>
+              </a:rPr>
+              <a:t>операции с</a:t>
+            </a:r>
+            <a:r>
+              <a:rPr lang="en-US" sz="3800" dirty="0">
+                <a:solidFill>
+                  <a:schemeClr val="bg2"/>
+                </a:solidFill>
+              </a:rPr>
+              <a:t> низ</a:t>
+            </a:r>
+            <a:r>
+              <a:rPr lang="bg-BG" sz="3800" dirty="0">
+                <a:solidFill>
+                  <a:schemeClr val="bg2"/>
+                </a:solidFill>
+              </a:rPr>
+              <a:t>:</a:t>
+            </a:r>
+            <a:endParaRPr lang="en-US" sz="3800" dirty="0">
               <a:solidFill>
                 <a:schemeClr val="bg2"/>
               </a:solidFill>
@@ -33566,6 +33687,9 @@
           </a:p>
           <a:p>
             <a:pPr marL="989965" lvl="1" indent="-380365" latinLnBrk="0">
+              <a:lnSpc>
+                <a:spcPct val="114000"/>
+              </a:lnSpc>
               <a:spcBef>
                 <a:spcPts val="1200"/>
               </a:spcBef>
@@ -33733,6 +33857,9 @@
           </a:p>
           <a:p>
             <a:pPr marL="456565" indent="-456565" latinLnBrk="0">
+              <a:lnSpc>
+                <a:spcPct val="110000"/>
+              </a:lnSpc>
               <a:spcBef>
                 <a:spcPts val="1200"/>
               </a:spcBef>
@@ -33741,7 +33868,7 @@
               </a:buClr>
             </a:pPr>
             <a:r>
-              <a:rPr lang="en-US" sz="3600" b="1" noProof="1">
+              <a:rPr lang="en-US" sz="3800" b="1" noProof="1">
                 <a:solidFill>
                   <a:schemeClr val="bg1">
                     <a:lumMod val="60000"/>
@@ -33753,7 +33880,7 @@
               <a:t>StringBuilder</a:t>
             </a:r>
             <a:r>
-              <a:rPr lang="en-US" sz="3600" dirty="0">
+              <a:rPr lang="en-US" sz="3800" dirty="0">
                 <a:solidFill>
                   <a:schemeClr val="bg2"/>
                 </a:solidFill>
@@ -33761,7 +33888,7 @@
               <a:t> </a:t>
             </a:r>
             <a:r>
-              <a:rPr lang="bg-BG" sz="3600" dirty="0">
+              <a:rPr lang="bg-BG" sz="3800" dirty="0">
                 <a:solidFill>
                   <a:schemeClr val="bg2"/>
                 </a:solidFill>
@@ -33769,18 +33896,17 @@
               <a:t>за </a:t>
             </a:r>
             <a:r>
-              <a:rPr lang="en-US" sz="3600" dirty="0">
+              <a:rPr lang="en-US" sz="3800" dirty="0">
                 <a:solidFill>
                   <a:schemeClr val="bg2"/>
                 </a:solidFill>
               </a:rPr>
               <a:t>ефективно изгражадане / модефикация на низ</a:t>
             </a:r>
-            <a:endParaRPr lang="en-US" sz="3600" dirty="0">
+            <a:endParaRPr lang="bg-BG" sz="3800" dirty="0">
               <a:solidFill>
                 <a:schemeClr val="bg2"/>
               </a:solidFill>
-              <a:cs typeface="Calibri"/>
             </a:endParaRPr>
           </a:p>
         </p:txBody>
@@ -33896,64 +34022,15 @@
                                   </p:childTnLst>
                                 </p:cTn>
                               </p:par>
-                            </p:childTnLst>
-                          </p:cTn>
-                        </p:par>
-                      </p:childTnLst>
-                    </p:cTn>
-                  </p:par>
-                  <p:par>
-                    <p:cTn id="7" fill="hold">
-                      <p:stCondLst>
-                        <p:cond delay="indefinite"/>
-                      </p:stCondLst>
-                      <p:childTnLst>
-                        <p:par>
-                          <p:cTn id="8" fill="hold">
-                            <p:stCondLst>
-                              <p:cond delay="0"/>
-                            </p:stCondLst>
-                            <p:childTnLst>
                               <p:par>
-                                <p:cTn id="9" presetID="1" presetClass="entr" presetSubtype="0" fill="hold" nodeType="clickEffect">
+                                <p:cTn id="7" presetID="1" presetClass="entr" presetSubtype="0" fill="hold" nodeType="withEffect">
                                   <p:stCondLst>
                                     <p:cond delay="0"/>
                                   </p:stCondLst>
                                   <p:childTnLst>
                                     <p:set>
                                       <p:cBhvr>
-                                        <p:cTn id="10" dur="1" fill="hold">
-                                          <p:stCondLst>
-                                            <p:cond delay="0"/>
-                                          </p:stCondLst>
-                                        </p:cTn>
-                                        <p:tgtEl>
-                                          <p:spTgt spid="15">
-                                            <p:txEl>
-                                              <p:pRg st="0" end="0"/>
-                                            </p:txEl>
-                                          </p:spTgt>
-                                        </p:tgtEl>
-                                        <p:attrNameLst>
-                                          <p:attrName>style.visibility</p:attrName>
-                                        </p:attrNameLst>
-                                      </p:cBhvr>
-                                      <p:to>
-                                        <p:strVal val="visible"/>
-                                      </p:to>
-                                    </p:set>
-                                  </p:childTnLst>
-                                </p:cTn>
-                              </p:par>
-                              <p:par>
-                                <p:cTn id="11" presetID="1" presetClass="entr" presetSubtype="0" fill="hold" nodeType="withEffect">
-                                  <p:stCondLst>
-                                    <p:cond delay="0"/>
-                                  </p:stCondLst>
-                                  <p:childTnLst>
-                                    <p:set>
-                                      <p:cBhvr>
-                                        <p:cTn id="12" dur="1" fill="hold">
+                                        <p:cTn id="8" dur="1" fill="hold">
                                           <p:stCondLst>
                                             <p:cond delay="0"/>
                                           </p:stCondLst>
@@ -33983,26 +34060,26 @@
                     </p:cTn>
                   </p:par>
                   <p:par>
-                    <p:cTn id="13" fill="hold">
+                    <p:cTn id="9" fill="hold">
                       <p:stCondLst>
                         <p:cond delay="indefinite"/>
                       </p:stCondLst>
                       <p:childTnLst>
                         <p:par>
-                          <p:cTn id="14" fill="hold">
+                          <p:cTn id="10" fill="hold">
                             <p:stCondLst>
                               <p:cond delay="0"/>
                             </p:stCondLst>
                             <p:childTnLst>
                               <p:par>
-                                <p:cTn id="15" presetID="1" presetClass="entr" presetSubtype="0" fill="hold" nodeType="clickEffect">
+                                <p:cTn id="11" presetID="1" presetClass="entr" presetSubtype="0" fill="hold" nodeType="clickEffect">
                                   <p:stCondLst>
                                     <p:cond delay="0"/>
                                   </p:stCondLst>
                                   <p:childTnLst>
                                     <p:set>
                                       <p:cBhvr>
-                                        <p:cTn id="16" dur="1" fill="hold">
+                                        <p:cTn id="12" dur="1" fill="hold">
                                           <p:stCondLst>
                                             <p:cond delay="0"/>
                                           </p:stCondLst>
@@ -34447,7 +34524,7 @@
         </p:nvSpPr>
         <p:spPr>
           <a:xfrm>
-            <a:off x="1794444" y="1115975"/>
+            <a:off x="1794444" y="999000"/>
             <a:ext cx="10326000" cy="5546589"/>
           </a:xfrm>
         </p:spPr>
@@ -34461,10 +34538,54 @@
               <a:lnSpc>
                 <a:spcPct val="100000"/>
               </a:lnSpc>
+              <a:buClr>
+                <a:schemeClr val="tx1"/>
+              </a:buClr>
             </a:pPr>
             <a:r>
+              <a:rPr lang="en-US" sz="3300" b="1" dirty="0">
+                <a:solidFill>
+                  <a:schemeClr val="bg1"/>
+                </a:solidFill>
+              </a:rPr>
+              <a:t>Низ</a:t>
+            </a:r>
+            <a:r>
               <a:rPr lang="en-US" sz="3300" dirty="0"/>
-              <a:t>Низът е </a:t>
+              <a:t> (</a:t>
+            </a:r>
+            <a:r>
+              <a:rPr lang="bg-BG" sz="3300" b="1" dirty="0">
+                <a:solidFill>
+                  <a:schemeClr val="bg1"/>
+                </a:solidFill>
+              </a:rPr>
+              <a:t>стринг</a:t>
+            </a:r>
+            <a:r>
+              <a:rPr lang="bg-BG" sz="3300" dirty="0"/>
+              <a:t>) == </a:t>
+            </a:r>
+            <a:r>
+              <a:rPr lang="en-US" sz="3300" dirty="0"/>
+              <a:t>редица от символи (текст)</a:t>
+            </a:r>
+            <a:endParaRPr lang="bg-BG" sz="3300" dirty="0">
+              <a:cs typeface="Calibri"/>
+            </a:endParaRPr>
+          </a:p>
+          <a:p>
+            <a:pPr marL="360045" indent="-360045">
+              <a:lnSpc>
+                <a:spcPct val="100000"/>
+              </a:lnSpc>
+              <a:buClr>
+                <a:schemeClr val="tx1"/>
+              </a:buClr>
+            </a:pPr>
+            <a:r>
+              <a:rPr lang="en-US" sz="3300" dirty="0"/>
+              <a:t>Низът е </a:t>
             </a:r>
             <a:r>
               <a:rPr lang="en-US" sz="3300" b="1" dirty="0">
@@ -34472,13 +34593,98 @@
                   <a:schemeClr val="bg1"/>
                 </a:solidFill>
               </a:rPr>
-              <a:t>редица от символи </a:t>
+              <a:t>тип данни </a:t>
             </a:r>
             <a:r>
               <a:rPr lang="en-US" sz="3300" dirty="0"/>
-              <a:t>(текст)</a:t>
-            </a:r>
-            <a:endParaRPr lang="bg-BG" sz="3300" dirty="0">
+              <a:t>в C#</a:t>
+            </a:r>
+            <a:endParaRPr lang="en-US" sz="3300" dirty="0">
+              <a:cs typeface="Calibri"/>
+            </a:endParaRPr>
+          </a:p>
+          <a:p>
+            <a:pPr lvl="1" indent="-360045">
+              <a:lnSpc>
+                <a:spcPct val="100000"/>
+              </a:lnSpc>
+            </a:pPr>
+            <a:r>
+              <a:rPr lang="en-US" sz="3300" dirty="0"/>
+              <a:t>Декларира се с</a:t>
+            </a:r>
+            <a:r>
+              <a:rPr lang="en-US" sz="3300" dirty="0">
+                <a:latin typeface="Calibri"/>
+                <a:cs typeface="Calibri"/>
+              </a:rPr>
+              <a:t> ключувата дума</a:t>
+            </a:r>
+            <a:r>
+              <a:rPr lang="en-US" sz="3300" dirty="0">
+                <a:solidFill>
+                  <a:srgbClr val="234465"/>
+                </a:solidFill>
+                <a:latin typeface="Calibri"/>
+                <a:cs typeface="Calibri"/>
+              </a:rPr>
+              <a:t> </a:t>
+            </a:r>
+            <a:r>
+              <a:rPr lang="en-US" sz="3300" b="1" dirty="0">
+                <a:solidFill>
+                  <a:schemeClr val="bg1"/>
+                </a:solidFill>
+                <a:latin typeface="Consolas"/>
+              </a:rPr>
+              <a:t>string</a:t>
+            </a:r>
+            <a:r>
+              <a:rPr lang="en-US" sz="3300" dirty="0"/>
+              <a:t> </a:t>
+            </a:r>
+            <a:endParaRPr lang="en-US" sz="3300" dirty="0">
+              <a:cs typeface="Calibri"/>
+            </a:endParaRPr>
+          </a:p>
+          <a:p>
+            <a:pPr lvl="1" indent="-360045">
+              <a:lnSpc>
+                <a:spcPct val="100000"/>
+              </a:lnSpc>
+            </a:pPr>
+            <a:r>
+              <a:rPr lang="bg-BG" sz="3300" dirty="0"/>
+              <a:t>Той</a:t>
+            </a:r>
+            <a:r>
+              <a:rPr lang="en-US" sz="3300" dirty="0"/>
+              <a:t> е от</a:t>
+            </a:r>
+            <a:r>
+              <a:rPr lang="en-US" sz="3300" dirty="0">
+                <a:solidFill>
+                  <a:srgbClr val="234465"/>
+                </a:solidFill>
+                <a:latin typeface="Calibri"/>
+                <a:cs typeface="Calibri"/>
+              </a:rPr>
+              <a:t>  </a:t>
+            </a:r>
+            <a:r>
+              <a:rPr lang="en-US" sz="3300" b="1" noProof="1">
+                <a:solidFill>
+                  <a:schemeClr val="bg1"/>
+                </a:solidFill>
+                <a:latin typeface="Consolas"/>
+              </a:rPr>
+              <a:t>System.String</a:t>
+            </a:r>
+            <a:r>
+              <a:rPr lang="en-US" sz="3300" dirty="0"/>
+              <a:t> .NET тип данни</a:t>
+            </a:r>
+            <a:endParaRPr lang="en-US" sz="3300" dirty="0">
               <a:cs typeface="Calibri"/>
             </a:endParaRPr>
           </a:p>
@@ -34490,114 +34696,23 @@
             </a:pPr>
             <a:r>
               <a:rPr lang="en-US" sz="3300" dirty="0"/>
-              <a:t>Низът е </a:t>
-            </a:r>
-            <a:r>
-              <a:rPr lang="en-US" sz="3300" b="1" dirty="0">
-                <a:solidFill>
-                  <a:schemeClr val="bg1"/>
-                </a:solidFill>
-              </a:rPr>
-              <a:t>тип данни </a:t>
-            </a:r>
-            <a:r>
-              <a:rPr lang="en-US" sz="3300" dirty="0"/>
-              <a:t>в C#</a:t>
-            </a:r>
-            <a:endParaRPr lang="en-US" sz="3300" dirty="0">
-              <a:cs typeface="Calibri"/>
-            </a:endParaRPr>
-          </a:p>
-          <a:p>
-            <a:pPr lvl="1" indent="-360045">
-              <a:lnSpc>
-                <a:spcPct val="100000"/>
-              </a:lnSpc>
-            </a:pPr>
-            <a:r>
-              <a:rPr lang="en-US" sz="3300" dirty="0"/>
-              <a:t>Декларира се с</a:t>
-            </a:r>
-            <a:r>
-              <a:rPr lang="en-US" sz="3300" dirty="0">
-                <a:latin typeface="Calibri"/>
-                <a:cs typeface="Calibri"/>
-              </a:rPr>
-              <a:t> ключувата дума</a:t>
-            </a:r>
-            <a:r>
-              <a:rPr lang="en-US" sz="3300" dirty="0">
-                <a:solidFill>
-                  <a:srgbClr val="234465"/>
-                </a:solidFill>
-                <a:latin typeface="Calibri"/>
-                <a:cs typeface="Calibri"/>
-              </a:rPr>
-              <a:t> </a:t>
-            </a:r>
-            <a:r>
-              <a:rPr lang="en-US" sz="3300" b="1" dirty="0">
-                <a:solidFill>
-                  <a:schemeClr val="bg1"/>
-                </a:solidFill>
-                <a:latin typeface="Consolas"/>
-              </a:rPr>
-              <a:t>string</a:t>
+              <a:t>Низовете са </a:t>
+            </a:r>
+            <a:r>
+              <a:rPr lang="bg-BG" sz="3300" dirty="0"/>
+              <a:t>оградени</a:t>
             </a:r>
             <a:r>
               <a:rPr lang="en-US" sz="3300" dirty="0"/>
               <a:t> </a:t>
             </a:r>
-            <a:endParaRPr lang="en-US" sz="3300" dirty="0">
-              <a:cs typeface="Calibri"/>
-            </a:endParaRPr>
-          </a:p>
-          <a:p>
-            <a:pPr lvl="1" indent="-360045">
-              <a:lnSpc>
-                <a:spcPct val="100000"/>
-              </a:lnSpc>
-            </a:pPr>
+            <a:r>
+              <a:rPr lang="bg-BG" sz="3300" dirty="0"/>
+              <a:t>с</a:t>
+            </a:r>
             <a:r>
               <a:rPr lang="en-US" sz="3300" dirty="0"/>
-              <a:t>Тя е от</a:t>
-            </a:r>
-            <a:r>
-              <a:rPr lang="en-US" sz="3300" dirty="0">
-                <a:solidFill>
-                  <a:srgbClr val="234465"/>
-                </a:solidFill>
-                <a:latin typeface="Calibri"/>
-                <a:cs typeface="Calibri"/>
-              </a:rPr>
-              <a:t>  </a:t>
-            </a:r>
-            <a:r>
-              <a:rPr lang="en-US" sz="3300" b="1" noProof="1">
-                <a:solidFill>
-                  <a:schemeClr val="bg1"/>
-                </a:solidFill>
-                <a:latin typeface="Consolas"/>
-              </a:rPr>
-              <a:t>System.String</a:t>
-            </a:r>
-            <a:r>
-              <a:rPr lang="en-US" sz="3300" dirty="0"/>
-              <a:t> .NET тип данни</a:t>
-            </a:r>
-            <a:endParaRPr lang="en-US" sz="3300" dirty="0">
-              <a:cs typeface="Calibri"/>
-            </a:endParaRPr>
-          </a:p>
-          <a:p>
-            <a:pPr marL="360045" indent="-360045">
-              <a:lnSpc>
-                <a:spcPct val="100000"/>
-              </a:lnSpc>
-            </a:pPr>
-            <a:r>
-              <a:rPr lang="en-US" sz="3300" dirty="0"/>
-              <a:t>Низовете са обградени в кавички:</a:t>
+              <a:t> кавички:</a:t>
             </a:r>
             <a:endParaRPr lang="en-US" sz="3300" dirty="0">
               <a:cs typeface="Calibri"/>
@@ -34618,10 +34733,25 @@
               <a:lnSpc>
                 <a:spcPct val="100000"/>
               </a:lnSpc>
+              <a:buClr>
+                <a:schemeClr val="tx1"/>
+              </a:buClr>
             </a:pPr>
             <a:r>
+              <a:rPr lang="bg-BG" sz="3300" b="1" dirty="0">
+                <a:solidFill>
+                  <a:schemeClr val="bg1"/>
+                </a:solidFill>
+              </a:rPr>
+              <a:t>Конкатенация</a:t>
+            </a:r>
+            <a:r>
+              <a:rPr lang="bg-BG" sz="3300" dirty="0"/>
+              <a:t> (долепяне)</a:t>
+            </a:r>
+            <a:r>
               <a:rPr lang="en-US" sz="3300" dirty="0"/>
-              <a:t>Конкатенация на два низа се</a:t>
+              <a:t> на два низа се</a:t>
             </a:r>
             <a:r>
               <a:rPr lang="bg-BG" sz="3300" dirty="0"/>
@@ -34684,7 +34814,7 @@
         </p:nvSpPr>
         <p:spPr>
           <a:xfrm>
-            <a:off x="2567609" y="4365104"/>
+            <a:off x="2271000" y="4239000"/>
             <a:ext cx="3892447" cy="587288"/>
           </a:xfrm>
           <a:prstGeom prst="rect">
@@ -34890,7 +35020,7 @@
         </p:nvSpPr>
         <p:spPr>
           <a:xfrm>
-            <a:off x="2567609" y="5742025"/>
+            <a:off x="2271000" y="6087507"/>
             <a:ext cx="5793817" cy="587288"/>
           </a:xfrm>
           <a:prstGeom prst="rect">
@@ -35274,6 +35404,37 @@
                                   </p:childTnLst>
                                 </p:cTn>
                               </p:par>
+                              <p:par>
+                                <p:cTn id="7" presetID="1" presetClass="entr" presetSubtype="0" fill="hold" nodeType="withEffect">
+                                  <p:stCondLst>
+                                    <p:cond delay="0"/>
+                                  </p:stCondLst>
+                                  <p:childTnLst>
+                                    <p:set>
+                                      <p:cBhvr>
+                                        <p:cTn id="8" dur="1" fill="hold">
+                                          <p:stCondLst>
+                                            <p:cond delay="0"/>
+                                          </p:stCondLst>
+                                        </p:cTn>
+                                        <p:tgtEl>
+                                          <p:spTgt spid="2">
+                                            <p:txEl>
+                                              <p:pRg st="2" end="2"/>
+                                            </p:txEl>
+                                          </p:spTgt>
+                                        </p:tgtEl>
+                                        <p:attrNameLst>
+                                          <p:attrName>style.visibility</p:attrName>
+                                        </p:attrNameLst>
+                                      </p:cBhvr>
+                                      <p:to>
+                                        <p:strVal val="visible"/>
+                                      </p:to>
+                                    </p:set>
+                                  </p:childTnLst>
+                                </p:cTn>
+                              </p:par>
                             </p:childTnLst>
                           </p:cTn>
                         </p:par>
@@ -35281,26 +35442,106 @@
                     </p:cTn>
                   </p:par>
                   <p:par>
-                    <p:cTn id="7" fill="hold">
+                    <p:cTn id="9" fill="hold">
                       <p:stCondLst>
                         <p:cond delay="indefinite"/>
                       </p:stCondLst>
                       <p:childTnLst>
                         <p:par>
-                          <p:cTn id="8" fill="hold">
+                          <p:cTn id="10" fill="hold">
                             <p:stCondLst>
                               <p:cond delay="0"/>
                             </p:stCondLst>
                             <p:childTnLst>
                               <p:par>
-                                <p:cTn id="9" presetID="1" presetClass="entr" presetSubtype="0" fill="hold" grpId="0" nodeType="clickEffect">
+                                <p:cTn id="11" presetID="1" presetClass="entr" presetSubtype="0" fill="hold" nodeType="clickEffect">
                                   <p:stCondLst>
                                     <p:cond delay="0"/>
                                   </p:stCondLst>
                                   <p:childTnLst>
                                     <p:set>
                                       <p:cBhvr>
-                                        <p:cTn id="10" dur="1" fill="hold">
+                                        <p:cTn id="12" dur="1" fill="hold">
+                                          <p:stCondLst>
+                                            <p:cond delay="0"/>
+                                          </p:stCondLst>
+                                        </p:cTn>
+                                        <p:tgtEl>
+                                          <p:spTgt spid="2">
+                                            <p:txEl>
+                                              <p:pRg st="3" end="3"/>
+                                            </p:txEl>
+                                          </p:spTgt>
+                                        </p:tgtEl>
+                                        <p:attrNameLst>
+                                          <p:attrName>style.visibility</p:attrName>
+                                        </p:attrNameLst>
+                                      </p:cBhvr>
+                                      <p:to>
+                                        <p:strVal val="visible"/>
+                                      </p:to>
+                                    </p:set>
+                                  </p:childTnLst>
+                                </p:cTn>
+                              </p:par>
+                            </p:childTnLst>
+                          </p:cTn>
+                        </p:par>
+                      </p:childTnLst>
+                    </p:cTn>
+                  </p:par>
+                  <p:par>
+                    <p:cTn id="13" fill="hold">
+                      <p:stCondLst>
+                        <p:cond delay="indefinite"/>
+                      </p:stCondLst>
+                      <p:childTnLst>
+                        <p:par>
+                          <p:cTn id="14" fill="hold">
+                            <p:stCondLst>
+                              <p:cond delay="0"/>
+                            </p:stCondLst>
+                            <p:childTnLst>
+                              <p:par>
+                                <p:cTn id="15" presetID="1" presetClass="entr" presetSubtype="0" fill="hold" nodeType="clickEffect">
+                                  <p:stCondLst>
+                                    <p:cond delay="0"/>
+                                  </p:stCondLst>
+                                  <p:childTnLst>
+                                    <p:set>
+                                      <p:cBhvr>
+                                        <p:cTn id="16" dur="1" fill="hold">
+                                          <p:stCondLst>
+                                            <p:cond delay="0"/>
+                                          </p:stCondLst>
+                                        </p:cTn>
+                                        <p:tgtEl>
+                                          <p:spTgt spid="2">
+                                            <p:txEl>
+                                              <p:pRg st="4" end="4"/>
+                                            </p:txEl>
+                                          </p:spTgt>
+                                        </p:tgtEl>
+                                        <p:attrNameLst>
+                                          <p:attrName>style.visibility</p:attrName>
+                                        </p:attrNameLst>
+                                      </p:cBhvr>
+                                      <p:to>
+                                        <p:strVal val="visible"/>
+                                      </p:to>
+                                    </p:set>
+                                  </p:childTnLst>
+                                </p:cTn>
+                              </p:par>
+                              <p:par>
+                                <p:cTn id="17" presetID="1" presetClass="entr" presetSubtype="0" fill="hold" grpId="0" nodeType="withEffect">
+                                  <p:stCondLst>
+                                    <p:cond delay="0"/>
+                                  </p:stCondLst>
+                                  <p:childTnLst>
+                                    <p:set>
+                                      <p:cBhvr>
+                                        <p:cTn id="18" dur="1" fill="hold">
                                           <p:stCondLst>
                                             <p:cond delay="0"/>
                                           </p:stCondLst>
@@ -35326,26 +35567,57 @@
                     </p:cTn>
                   </p:par>
                   <p:par>
-                    <p:cTn id="11" fill="hold">
+                    <p:cTn id="19" fill="hold">
                       <p:stCondLst>
                         <p:cond delay="indefinite"/>
                       </p:stCondLst>
                       <p:childTnLst>
                         <p:par>
-                          <p:cTn id="12" fill="hold">
+                          <p:cTn id="20" fill="hold">
                             <p:stCondLst>
                               <p:cond delay="0"/>
                             </p:stCondLst>
                             <p:childTnLst>
                               <p:par>
-                                <p:cTn id="13" presetID="1" presetClass="entr" presetSubtype="0" fill="hold" grpId="0" nodeType="clickEffect">
+                                <p:cTn id="21" presetID="1" presetClass="entr" presetSubtype="0" fill="hold" nodeType="clickEffect">
                                   <p:stCondLst>
                                     <p:cond delay="0"/>
                                   </p:stCondLst>
                                   <p:childTnLst>
                                     <p:set>
                                       <p:cBhvr>
-                                        <p:cTn id="14" dur="1" fill="hold">
+                                        <p:cTn id="22" dur="1" fill="hold">
+                                          <p:stCondLst>
+                                            <p:cond delay="0"/>
+                                          </p:stCondLst>
+                                        </p:cTn>
+                                        <p:tgtEl>
+                                          <p:spTgt spid="2">
+                                            <p:txEl>
+                                              <p:pRg st="6" end="6"/>
+                                            </p:txEl>
+                                          </p:spTgt>
+                                        </p:tgtEl>
+                                        <p:attrNameLst>
+                                          <p:attrName>style.visibility</p:attrName>
+                                        </p:attrNameLst>
+                                      </p:cBhvr>
+                                      <p:to>
+                                        <p:strVal val="visible"/>
+                                      </p:to>
+                                    </p:set>
+                                  </p:childTnLst>
+                                </p:cTn>
+                              </p:par>
+                              <p:par>
+                                <p:cTn id="23" presetID="1" presetClass="entr" presetSubtype="0" fill="hold" grpId="0" nodeType="withEffect">
+                                  <p:stCondLst>
+                                    <p:cond delay="0"/>
+                                  </p:stCondLst>
+                                  <p:childTnLst>
+                                    <p:set>
+                                      <p:cBhvr>
+                                        <p:cTn id="24" dur="1" fill="hold">
                                           <p:stCondLst>
                                             <p:cond delay="0"/>
                                           </p:stCondLst>
@@ -35513,11 +35785,7 @@
                   <a:schemeClr val="bg1"/>
                 </a:solidFill>
               </a:rPr>
-              <a:t>индекс </a:t>
-            </a:r>
-            <a:r>
-              <a:rPr lang="en-US" sz="3600" dirty="0"/>
-              <a:t>(само за четене)</a:t>
+              <a:t>индекс</a:t>
             </a:r>
             <a:endParaRPr lang="en-US" sz="3600" dirty="0">
               <a:cs typeface="Calibri"/>
@@ -35554,7 +35822,7 @@
                 <a:spcPct val="100000"/>
               </a:lnSpc>
               <a:spcBef>
-                <a:spcPts val="1200"/>
+                <a:spcPts val="2500"/>
               </a:spcBef>
             </a:pPr>
             <a:r>
@@ -35827,7 +36095,7 @@
         </p:nvSpPr>
         <p:spPr>
           <a:xfrm>
-            <a:off x="2495600" y="5343530"/>
+            <a:off x="2495600" y="5501488"/>
             <a:ext cx="7992888" cy="582512"/>
           </a:xfrm>
           <a:prstGeom prst="rect">
@@ -36255,33 +36523,15 @@
                                   </p:childTnLst>
                                 </p:cTn>
                               </p:par>
-                            </p:childTnLst>
-                          </p:cTn>
-                        </p:par>
-                      </p:childTnLst>
-                    </p:cTn>
-                  </p:par>
-                  <p:par>
-                    <p:cTn id="7" fill="hold">
-                      <p:stCondLst>
-                        <p:cond delay="indefinite"/>
-                      </p:stCondLst>
-                      <p:childTnLst>
-                        <p:par>
-                          <p:cTn id="8" fill="hold">
-                            <p:stCondLst>
-                              <p:cond delay="0"/>
-                            </p:stCondLst>
-                            <p:childTnLst>
                               <p:par>
-                                <p:cTn id="9" presetID="1" presetClass="entr" presetSubtype="0" fill="hold" grpId="0" nodeType="clickEffect">
+                                <p:cTn id="7" presetID="1" presetClass="entr" presetSubtype="0" fill="hold" grpId="0" nodeType="withEffect">
                                   <p:stCondLst>
                                     <p:cond delay="0"/>
                                   </p:stCondLst>
                                   <p:childTnLst>
                                     <p:set>
                                       <p:cBhvr>
-                                        <p:cTn id="10" dur="1" fill="hold">
+                                        <p:cTn id="8" dur="1" fill="hold">
                                           <p:stCondLst>
                                             <p:cond delay="0"/>
                                           </p:stCondLst>
@@ -36307,26 +36557,26 @@
                     </p:cTn>
                   </p:par>
                   <p:par>
-                    <p:cTn id="11" fill="hold">
+                    <p:cTn id="9" fill="hold">
                       <p:stCondLst>
                         <p:cond delay="indefinite"/>
                       </p:stCondLst>
                       <p:childTnLst>
                         <p:par>
-                          <p:cTn id="12" fill="hold">
+                          <p:cTn id="10" fill="hold">
                             <p:stCondLst>
                               <p:cond delay="0"/>
                             </p:stCondLst>
                             <p:childTnLst>
                               <p:par>
-                                <p:cTn id="13" presetID="1" presetClass="entr" presetSubtype="0" fill="hold" nodeType="clickEffect">
+                                <p:cTn id="11" presetID="1" presetClass="entr" presetSubtype="0" fill="hold" nodeType="clickEffect">
                                   <p:stCondLst>
                                     <p:cond delay="0"/>
                                   </p:stCondLst>
                                   <p:childTnLst>
                                     <p:set>
                                       <p:cBhvr>
-                                        <p:cTn id="14" dur="1" fill="hold">
+                                        <p:cTn id="12" dur="1" fill="hold">
                                           <p:stCondLst>
                                             <p:cond delay="0"/>
                                           </p:stCondLst>
@@ -36349,33 +36599,15 @@
                                   </p:childTnLst>
                                 </p:cTn>
                               </p:par>
-                            </p:childTnLst>
-                          </p:cTn>
-                        </p:par>
-                      </p:childTnLst>
-                    </p:cTn>
-                  </p:par>
-                  <p:par>
-                    <p:cTn id="15" fill="hold">
-                      <p:stCondLst>
-                        <p:cond delay="indefinite"/>
-                      </p:stCondLst>
-                      <p:childTnLst>
-                        <p:par>
-                          <p:cTn id="16" fill="hold">
-                            <p:stCondLst>
-                              <p:cond delay="0"/>
-                            </p:stCondLst>
-                            <p:childTnLst>
                               <p:par>
-                                <p:cTn id="17" presetID="1" presetClass="entr" presetSubtype="0" fill="hold" grpId="0" nodeType="clickEffect">
+                                <p:cTn id="13" presetID="1" presetClass="entr" presetSubtype="0" fill="hold" grpId="0" nodeType="withEffect">
                                   <p:stCondLst>
                                     <p:cond delay="0"/>
                                   </p:stCondLst>
                                   <p:childTnLst>
                                     <p:set>
                                       <p:cBhvr>
-                                        <p:cTn id="18" dur="1" fill="hold">
+                                        <p:cTn id="14" dur="1" fill="hold">
                                           <p:stCondLst>
                                             <p:cond delay="0"/>
                                           </p:stCondLst>
@@ -36470,7 +36702,24 @@
                 <a:ea typeface="+mn-lt"/>
                 <a:cs typeface="+mn-lt"/>
               </a:rPr>
-              <a:t>Низът се инициализира </a:t>
+              <a:t>Низът се </a:t>
+            </a:r>
+            <a:r>
+              <a:rPr lang="en-US" sz="3350" b="1" dirty="0">
+                <a:solidFill>
+                  <a:schemeClr val="bg1"/>
+                </a:solidFill>
+                <a:ea typeface="+mn-lt"/>
+                <a:cs typeface="+mn-lt"/>
+              </a:rPr>
+              <a:t>инициализира</a:t>
+            </a:r>
+            <a:r>
+              <a:rPr lang="en-US" sz="3350" dirty="0">
+                <a:ea typeface="+mn-lt"/>
+                <a:cs typeface="+mn-lt"/>
+              </a:rPr>
+              <a:t> </a:t>
             </a:r>
             <a:r>
               <a:rPr lang="bg-BG" sz="3350" dirty="0">
@@ -36599,15 +36848,11 @@
           <a:lstStyle/>
           <a:p>
             <a:r>
-              <a:rPr lang="en-GB" sz="3950" dirty="0">
+              <a:rPr lang="bg-BG" sz="3950" dirty="0">
                 <a:ea typeface="+mj-lt"/>
                 <a:cs typeface="+mj-lt"/>
               </a:rPr>
-              <a:t>Инициализиране </a:t>
-            </a:r>
-            <a:r>
-              <a:rPr lang="en-GB" sz="3950" dirty="0"/>
-              <a:t>на низ</a:t>
+              <a:t>Основни операции с низове</a:t>
             </a:r>
             <a:endParaRPr lang="bg-BG" sz="3950" dirty="0">
               <a:cs typeface="Calibri"/>
@@ -36625,7 +36870,7 @@
         </p:nvSpPr>
         <p:spPr bwMode="auto">
           <a:xfrm>
-            <a:off x="2576106" y="1849196"/>
+            <a:off x="651000" y="1854000"/>
             <a:ext cx="5104070" cy="544623"/>
           </a:xfrm>
           <a:prstGeom prst="rect">
@@ -36699,7 +36944,7 @@
         </p:nvSpPr>
         <p:spPr bwMode="auto">
           <a:xfrm>
-            <a:off x="2560498" y="3193865"/>
+            <a:off x="651000" y="3247411"/>
             <a:ext cx="6703854" cy="996936"/>
           </a:xfrm>
           <a:prstGeom prst="rect">
@@ -36797,7 +37042,7 @@
         </p:nvSpPr>
         <p:spPr bwMode="auto">
           <a:xfrm>
-            <a:off x="2566426" y="4795476"/>
+            <a:off x="647459" y="4842131"/>
             <a:ext cx="8354111" cy="1882760"/>
           </a:xfrm>
           <a:prstGeom prst="rect">
@@ -37015,9 +37260,7 @@
             <a:r>
               <a:rPr lang="en-US" sz="2799" b="1" i="1" noProof="1">
                 <a:solidFill>
-                  <a:schemeClr val="accent2">
-                    <a:lumMod val="75000"/>
-                  </a:schemeClr>
+                  <a:schemeClr val="accent2"/>
                 </a:solidFill>
                 <a:latin typeface="Consolas" pitchFamily="49" charset="0"/>
                 <a:cs typeface="Consolas" pitchFamily="49" charset="0"/>
@@ -37027,9 +37270,7 @@
             <a:r>
               <a:rPr lang="en-US" sz="2799" b="1" i="1" noProof="1">
                 <a:solidFill>
-                  <a:schemeClr val="accent2">
-                    <a:lumMod val="75000"/>
-                  </a:schemeClr>
+                  <a:schemeClr val="accent2"/>
                 </a:solidFill>
                 <a:latin typeface="+mj-lt"/>
                 <a:cs typeface="Consolas" pitchFamily="49" charset="0"/>
@@ -37039,9 +37280,7 @@
             <a:r>
               <a:rPr lang="en-US" sz="2799" b="1" i="1" noProof="1">
                 <a:solidFill>
-                  <a:schemeClr val="accent2">
-                    <a:lumMod val="75000"/>
-                  </a:schemeClr>
+                  <a:schemeClr val="accent2"/>
                 </a:solidFill>
                 <a:latin typeface="Consolas" pitchFamily="49" charset="0"/>
                 <a:cs typeface="Consolas" pitchFamily="49" charset="0"/>
@@ -37051,9 +37290,7 @@
             <a:r>
               <a:rPr lang="en-US" sz="2799" b="1" i="1" noProof="1">
                 <a:solidFill>
-                  <a:schemeClr val="accent2">
-                    <a:lumMod val="75000"/>
-                  </a:schemeClr>
+                  <a:schemeClr val="accent2"/>
                 </a:solidFill>
                 <a:latin typeface="+mj-lt"/>
                 <a:cs typeface="Consolas" pitchFamily="49" charset="0"/>
@@ -37063,9 +37300,7 @@
             <a:r>
               <a:rPr lang="en-US" sz="2799" b="1" i="1" noProof="1">
                 <a:solidFill>
-                  <a:schemeClr val="accent2">
-                    <a:lumMod val="75000"/>
-                  </a:schemeClr>
+                  <a:schemeClr val="accent2"/>
                 </a:solidFill>
                 <a:latin typeface="Consolas" pitchFamily="49" charset="0"/>
                 <a:cs typeface="Consolas" pitchFamily="49" charset="0"/>
@@ -37454,7 +37689,7 @@
               <a:rPr lang="bg-BG" sz="3950" dirty="0">
                 <a:cs typeface="Arial"/>
               </a:rPr>
-              <a:t>Конкатенация, подниз и методи</a:t>
+              <a:t>Конкатенация, подниз, заместване</a:t>
             </a:r>
             <a:endParaRPr lang="bg-BG" sz="3950" dirty="0"/>
           </a:p>
@@ -37604,8 +37839,12 @@
               <a:defRPr/>
             </a:pPr>
             <a:r>
+              <a:rPr lang="bg-BG" sz="3600" dirty="0"/>
+              <a:t>Чрез символите</a:t>
+            </a:r>
+            <a:r>
               <a:rPr lang="en-US" sz="3600" dirty="0"/>
-              <a:t>Използваме </a:t>
+              <a:t> </a:t>
             </a:r>
             <a:r>
               <a:rPr lang="en-US" sz="3600" b="1" dirty="0">
@@ -37637,11 +37876,16 @@
               </a:rPr>
               <a:t>+=</a:t>
             </a:r>
-            <a:endParaRPr lang="en-US" sz="3600" b="1" dirty="0">
-              <a:solidFill>
-                <a:srgbClr val="234465"/>
-              </a:solidFill>
-              <a:cs typeface="Calibri"/>
+            <a:r>
+              <a:rPr lang="bg-BG" sz="3600" dirty="0">
+                <a:latin typeface="Calibri" panose="020F0502020204030204" pitchFamily="34" charset="0"/>
+                <a:cs typeface="Calibri" panose="020F0502020204030204" pitchFamily="34" charset="0"/>
+              </a:rPr>
+              <a:t>:</a:t>
+            </a:r>
+            <a:endParaRPr lang="en-US" sz="3600" dirty="0">
+              <a:latin typeface="Calibri" panose="020F0502020204030204" pitchFamily="34" charset="0"/>
+              <a:cs typeface="Calibri" panose="020F0502020204030204" pitchFamily="34" charset="0"/>
             </a:endParaRPr>
           </a:p>
           <a:p>
@@ -37738,11 +37982,18 @@
               <a:defRPr/>
             </a:pPr>
             <a:r>
+              <a:rPr lang="bg-BG" sz="3600" dirty="0">
+                <a:latin typeface="Calibri"/>
+                <a:cs typeface="Calibri"/>
+              </a:rPr>
+              <a:t>Чрез </a:t>
+            </a:r>
+            <a:r>
               <a:rPr lang="en-GB" sz="3600" dirty="0">
                 <a:latin typeface="Calibri"/>
                 <a:cs typeface="Calibri"/>
               </a:rPr>
-              <a:t>Използване на метода</a:t>
+              <a:t>метода</a:t>
             </a:r>
             <a:r>
               <a:rPr lang="en-GB" sz="3600" dirty="0">
@@ -37771,6 +38022,13 @@
                 <a:latin typeface="Consolas"/>
               </a:rPr>
               <a:t>()</a:t>
+            </a:r>
+            <a:r>
+              <a:rPr lang="bg-BG" sz="3600" dirty="0">
+                <a:latin typeface="Calibri" panose="020F0502020204030204" pitchFamily="34" charset="0"/>
+                <a:cs typeface="Calibri" panose="020F0502020204030204" pitchFamily="34" charset="0"/>
+              </a:rPr>
+              <a:t>:</a:t>
             </a:r>
             <a:endParaRPr lang="en-GB" sz="3600" b="1" dirty="0">
               <a:solidFill>
@@ -37809,8 +38067,8 @@
           <a:lstStyle/>
           <a:p>
             <a:r>
-              <a:rPr lang="en-GB" sz="3950" dirty="0"/>
-              <a:t>Конкатенация</a:t>
+              <a:rPr lang="bg-BG" sz="3950" dirty="0"/>
+              <a:t>Начини за конкатенация</a:t>
             </a:r>
             <a:endParaRPr lang="bg-BG" dirty="0"/>
           </a:p>
@@ -39230,7 +39488,12 @@
             <p:ph type="body" sz="quarter" idx="10"/>
           </p:nvPr>
         </p:nvSpPr>
-        <p:spPr/>
+        <p:spPr>
+          <a:xfrm>
+            <a:off x="111000" y="1196125"/>
+            <a:ext cx="12070598" cy="5528766"/>
+          </a:xfrm>
+        </p:spPr>
         <p:txBody>
           <a:bodyPr vert="horz" lIns="108000" tIns="36000" rIns="108000" bIns="36000" rtlCol="0" anchor="t">
             <a:normAutofit/>
@@ -39273,7 +39536,25 @@
                 </a:solidFill>
                 <a:cs typeface="Calibri"/>
               </a:rPr>
-              <a:t>Повторете думата </a:t>
+              <a:t>Повторете </a:t>
+            </a:r>
+            <a:r>
+              <a:rPr lang="bg-BG" sz="3600" dirty="0">
+                <a:solidFill>
+                  <a:srgbClr val="234465"/>
+                </a:solidFill>
+                <a:cs typeface="Calibri"/>
+              </a:rPr>
+              <a:t>всеки низ</a:t>
+            </a:r>
+            <a:r>
+              <a:rPr lang="en-US" sz="3600" dirty="0">
+                <a:solidFill>
+                  <a:srgbClr val="234465"/>
+                </a:solidFill>
+                <a:cs typeface="Calibri"/>
+              </a:rPr>
+              <a:t> </a:t>
             </a:r>
             <a:r>
               <a:rPr lang="en-US" sz="3600" b="1" dirty="0">
@@ -39334,11 +39615,18 @@
               <a:t>Задача: </a:t>
             </a:r>
             <a:r>
+              <a:rPr lang="bg-BG" sz="3950" dirty="0">
+                <a:ea typeface="+mj-lt"/>
+                <a:cs typeface="+mj-lt"/>
+              </a:rPr>
+              <a:t>Повторение</a:t>
+            </a:r>
+            <a:r>
               <a:rPr lang="en-US" sz="3950" dirty="0">
                 <a:ea typeface="+mj-lt"/>
                 <a:cs typeface="+mj-lt"/>
               </a:rPr>
-              <a:t>Повтаряне на низове</a:t>
+              <a:t> на низове</a:t>
             </a:r>
             <a:endParaRPr lang="en-US" sz="3950" dirty="0">
               <a:cs typeface="Calibri"/>
@@ -39360,10 +39648,10 @@
         </p:nvGrpSpPr>
         <p:grpSpPr>
           <a:xfrm>
-            <a:off x="2365004" y="3339000"/>
-            <a:ext cx="7461992" cy="556519"/>
+            <a:off x="2091000" y="3204000"/>
+            <a:ext cx="8275996" cy="618162"/>
             <a:chOff x="2055812" y="3150668"/>
-            <a:chExt cx="7463936" cy="556664"/>
+            <a:chExt cx="8278152" cy="618323"/>
           </a:xfrm>
         </p:grpSpPr>
         <p:sp>
@@ -39383,7 +39671,7 @@
           <p:spPr>
             <a:xfrm>
               <a:off x="2055812" y="3150668"/>
-              <a:ext cx="2133600" cy="556664"/>
+              <a:ext cx="2133600" cy="618323"/>
             </a:xfrm>
             <a:prstGeom prst="rect">
               <a:avLst/>
@@ -39579,7 +39867,7 @@
             <a:p>
               <a:pPr algn="ctr"/>
               <a:r>
-                <a:rPr lang="en-US" sz="2199" dirty="0">
+                <a:rPr lang="en-US" sz="2600" dirty="0">
                   <a:solidFill>
                     <a:schemeClr val="tx1"/>
                   </a:solidFill>
@@ -39606,7 +39894,7 @@
           <p:spPr>
             <a:xfrm>
               <a:off x="5789612" y="3150668"/>
-              <a:ext cx="3730136" cy="556664"/>
+              <a:ext cx="4544352" cy="618323"/>
             </a:xfrm>
             <a:prstGeom prst="rect">
               <a:avLst/>
@@ -39802,7 +40090,7 @@
             <a:p>
               <a:pPr algn="ctr"/>
               <a:r>
-                <a:rPr lang="en-US" sz="2199" dirty="0">
+                <a:rPr lang="en-US" sz="2600" dirty="0">
                   <a:solidFill>
                     <a:schemeClr val="tx1"/>
                   </a:solidFill>
@@ -39903,10 +40191,10 @@
         </p:nvGrpSpPr>
         <p:grpSpPr>
           <a:xfrm>
-            <a:off x="2365004" y="4390403"/>
-            <a:ext cx="7461992" cy="556519"/>
+            <a:off x="2091000" y="4255403"/>
+            <a:ext cx="8275996" cy="618162"/>
             <a:chOff x="2055812" y="3150668"/>
-            <a:chExt cx="7463936" cy="556664"/>
+            <a:chExt cx="8278152" cy="618323"/>
           </a:xfrm>
         </p:grpSpPr>
         <p:sp>
@@ -39926,7 +40214,7 @@
           <p:spPr>
             <a:xfrm>
               <a:off x="2055812" y="3150668"/>
-              <a:ext cx="2133600" cy="556664"/>
+              <a:ext cx="2133600" cy="618323"/>
             </a:xfrm>
             <a:prstGeom prst="rect">
               <a:avLst/>
@@ -40122,7 +40410,7 @@
             <a:p>
               <a:pPr algn="ctr"/>
               <a:r>
-                <a:rPr lang="en-US" sz="2199" dirty="0">
+                <a:rPr lang="en-US" sz="2600" dirty="0">
                   <a:solidFill>
                     <a:schemeClr val="tx1"/>
                   </a:solidFill>
@@ -40149,7 +40437,7 @@
           <p:spPr>
             <a:xfrm>
               <a:off x="5789612" y="3150668"/>
-              <a:ext cx="3730136" cy="556664"/>
+              <a:ext cx="4544352" cy="618323"/>
             </a:xfrm>
             <a:prstGeom prst="rect">
               <a:avLst/>
@@ -40345,7 +40633,7 @@
             <a:p>
               <a:pPr algn="ctr"/>
               <a:r>
-                <a:rPr lang="en-US" sz="2199" dirty="0">
+                <a:rPr lang="en-US" sz="2600" dirty="0">
                   <a:solidFill>
                     <a:schemeClr val="tx1"/>
                   </a:solidFill>
@@ -40370,10 +40658,10 @@
         </p:nvGrpSpPr>
         <p:grpSpPr>
           <a:xfrm>
-            <a:off x="2365004" y="5441806"/>
-            <a:ext cx="7461992" cy="556519"/>
+            <a:off x="2091000" y="5306806"/>
+            <a:ext cx="8275996" cy="618162"/>
             <a:chOff x="2055812" y="3150668"/>
-            <a:chExt cx="7463936" cy="556664"/>
+            <a:chExt cx="8278152" cy="618323"/>
           </a:xfrm>
         </p:grpSpPr>
         <p:sp>
@@ -40393,7 +40681,7 @@
           <p:spPr>
             <a:xfrm>
               <a:off x="2055812" y="3150668"/>
-              <a:ext cx="2133600" cy="556664"/>
+              <a:ext cx="2133600" cy="618323"/>
             </a:xfrm>
             <a:prstGeom prst="rect">
               <a:avLst/>
@@ -40589,7 +40877,7 @@
             <a:p>
               <a:pPr algn="ctr"/>
               <a:r>
-                <a:rPr lang="en-US" sz="2199" dirty="0">
+                <a:rPr lang="en-US" sz="2600" dirty="0">
                   <a:solidFill>
                     <a:schemeClr val="tx1"/>
                   </a:solidFill>
@@ -40616,7 +40904,7 @@
           <p:spPr>
             <a:xfrm>
               <a:off x="5789612" y="3150668"/>
-              <a:ext cx="3730136" cy="556664"/>
+              <a:ext cx="4544352" cy="618323"/>
             </a:xfrm>
             <a:prstGeom prst="rect">
               <a:avLst/>
@@ -40812,7 +41100,7 @@
             <a:p>
               <a:pPr algn="ctr"/>
               <a:r>
-                <a:rPr lang="en-US" sz="2199" dirty="0">
+                <a:rPr lang="en-US" sz="2600" dirty="0">
                   <a:solidFill>
                     <a:schemeClr val="tx1"/>
                   </a:solidFill>
@@ -40837,7 +41125,7 @@
         </p:nvSpPr>
         <p:spPr bwMode="auto">
           <a:xfrm>
-            <a:off x="4907770" y="4436531"/>
+            <a:off x="4633766" y="4301531"/>
             <a:ext cx="685621" cy="461545"/>
           </a:xfrm>
           <a:prstGeom prst="rightArrow">
@@ -40913,7 +41201,7 @@
         </p:nvSpPr>
         <p:spPr bwMode="auto">
           <a:xfrm>
-            <a:off x="4907770" y="5489294"/>
+            <a:off x="4633766" y="5354294"/>
             <a:ext cx="685621" cy="461545"/>
           </a:xfrm>
           <a:prstGeom prst="rightArrow">
@@ -41069,7 +41357,11 @@
                                           </p:stCondLst>
                                         </p:cTn>
                                         <p:tgtEl>
-                                          <p:spTgt spid="10"/>
+                                          <p:spTgt spid="3">
+                                            <p:txEl>
+                                              <p:pRg st="1" end="1"/>
+                                            </p:txEl>
+                                          </p:spTgt>
                                         </p:tgtEl>
                                         <p:attrNameLst>
                                           <p:attrName>style.visibility</p:attrName>
@@ -41114,6 +41406,51 @@
                                           </p:stCondLst>
                                         </p:cTn>
                                         <p:tgtEl>
+                                          <p:spTgt spid="10"/>
+                                        </p:tgtEl>
+                                        <p:attrNameLst>
+                                          <p:attrName>style.visibility</p:attrName>
+                                        </p:attrNameLst>
+                                      </p:cBhvr>
+                                      <p:to>
+                                        <p:strVal val="visible"/>
+                                      </p:to>
+                                    </p:set>
+                                  </p:childTnLst>
+                                </p:cTn>
+                              </p:par>
+                            </p:childTnLst>
+                          </p:cTn>
+                        </p:par>
+                      </p:childTnLst>
+                    </p:cTn>
+                  </p:par>
+                  <p:par>
+                    <p:cTn id="11" fill="hold">
+                      <p:stCondLst>
+                        <p:cond delay="indefinite"/>
+                      </p:stCondLst>
+                      <p:childTnLst>
+                        <p:par>
+                          <p:cTn id="12" fill="hold">
+                            <p:stCondLst>
+                              <p:cond delay="0"/>
+                            </p:stCondLst>
+                            <p:childTnLst>
+                              <p:par>
+                                <p:cTn id="13" presetID="1" presetClass="entr" presetSubtype="0" fill="hold" nodeType="clickEffect">
+                                  <p:stCondLst>
+                                    <p:cond delay="0"/>
+                                  </p:stCondLst>
+                                  <p:childTnLst>
+                                    <p:set>
+                                      <p:cBhvr>
+                                        <p:cTn id="14" dur="1" fill="hold">
+                                          <p:stCondLst>
+                                            <p:cond delay="0"/>
+                                          </p:stCondLst>
+                                        </p:cTn>
+                                        <p:tgtEl>
                                           <p:spTgt spid="12"/>
                                         </p:tgtEl>
                                         <p:attrNameLst>
@@ -41128,14 +41465,14 @@
                                 </p:cTn>
                               </p:par>
                               <p:par>
-                                <p:cTn id="11" presetID="1" presetClass="entr" presetSubtype="0" fill="hold" grpId="0" nodeType="withEffect">
+                                <p:cTn id="15" presetID="1" presetClass="entr" presetSubtype="0" fill="hold" grpId="0" nodeType="withEffect">
                                   <p:stCondLst>
                                     <p:cond delay="0"/>
                                   </p:stCondLst>
                                   <p:childTnLst>
                                     <p:set>
                                       <p:cBhvr>
-                                        <p:cTn id="12" dur="1" fill="hold">
+                                        <p:cTn id="16" dur="1" fill="hold">
                                           <p:stCondLst>
                                             <p:cond delay="0"/>
                                           </p:stCondLst>
@@ -41161,26 +41498,26 @@
                     </p:cTn>
                   </p:par>
                   <p:par>
-                    <p:cTn id="13" fill="hold">
+                    <p:cTn id="17" fill="hold">
                       <p:stCondLst>
                         <p:cond delay="indefinite"/>
                       </p:stCondLst>
                       <p:childTnLst>
                         <p:par>
-                          <p:cTn id="14" fill="hold">
+                          <p:cTn id="18" fill="hold">
                             <p:stCondLst>
                               <p:cond delay="0"/>
                             </p:stCondLst>
                             <p:childTnLst>
                               <p:par>
-                                <p:cTn id="15" presetID="1" presetClass="entr" presetSubtype="0" fill="hold" nodeType="clickEffect">
+                                <p:cTn id="19" presetID="1" presetClass="entr" presetSubtype="0" fill="hold" nodeType="clickEffect">
                                   <p:stCondLst>
                                     <p:cond delay="0"/>
                                   </p:stCondLst>
                                   <p:childTnLst>
                                     <p:set>
                                       <p:cBhvr>
-                                        <p:cTn id="16" dur="1" fill="hold">
+                                        <p:cTn id="20" dur="1" fill="hold">
                                           <p:stCondLst>
                                             <p:cond delay="0"/>
                                           </p:stCondLst>
@@ -41200,14 +41537,14 @@
                                 </p:cTn>
                               </p:par>
                               <p:par>
-                                <p:cTn id="17" presetID="1" presetClass="entr" presetSubtype="0" fill="hold" grpId="0" nodeType="withEffect">
+                                <p:cTn id="21" presetID="1" presetClass="entr" presetSubtype="0" fill="hold" grpId="0" nodeType="withEffect">
                                   <p:stCondLst>
                                     <p:cond delay="0"/>
                                   </p:stCondLst>
                                   <p:childTnLst>
                                     <p:set>
                                       <p:cBhvr>
-                                        <p:cTn id="18" dur="1" fill="hold">
+                                        <p:cTn id="22" dur="1" fill="hold">
                                           <p:stCondLst>
                                             <p:cond delay="0"/>
                                           </p:stCondLst>

</xml_diff>